<commit_message>
Added aide_design to cheat sheet
</commit_message>
<xml_diff>
--- a/AguaClara Water Treatment Plant Design/Cheat Sheets/Diagrams.pptx
+++ b/AguaClara Water Treatment Plant Design/Cheat Sheets/Diagrams.pptx
@@ -3328,10 +3328,10 @@
       </p:grpSpPr>
       <p:grpSp>
         <p:nvGrpSpPr>
-          <p:cNvPr id="16" name="Group 15">
-            <a:extLst>
-              <a:ext uri="{FF2B5EF4-FFF2-40B4-BE49-F238E27FC236}">
-                <a16:creationId xmlns:a16="http://schemas.microsoft.com/office/drawing/2014/main" id="{C2894E0B-196D-4819-B81D-E79A19AA731E}"/>
+          <p:cNvPr id="14" name="Group 13">
+            <a:extLst>
+              <a:ext uri="{FF2B5EF4-FFF2-40B4-BE49-F238E27FC236}">
+                <a16:creationId xmlns:a16="http://schemas.microsoft.com/office/drawing/2014/main" id="{2D5FCC65-D7BF-4228-972B-310D0E42290C}"/>
               </a:ext>
             </a:extLst>
           </p:cNvPr>
@@ -3340,94 +3340,18 @@
         </p:nvGrpSpPr>
         <p:grpSpPr>
           <a:xfrm>
-            <a:off x="1898510" y="1651518"/>
-            <a:ext cx="7469226" cy="4181354"/>
-            <a:chOff x="1439694" y="1394668"/>
-            <a:chExt cx="7928042" cy="4438204"/>
+            <a:off x="1484008" y="1352237"/>
+            <a:ext cx="7585227" cy="3619575"/>
+            <a:chOff x="1987129" y="1620113"/>
+            <a:chExt cx="8828310" cy="4212759"/>
           </a:xfrm>
         </p:grpSpPr>
-        <p:cxnSp>
-          <p:nvCxnSpPr>
-            <p:cNvPr id="41" name="Straight Connector 40">
+        <p:grpSp>
+          <p:nvGrpSpPr>
+            <p:cNvPr id="16" name="Group 15">
               <a:extLst>
                 <a:ext uri="{FF2B5EF4-FFF2-40B4-BE49-F238E27FC236}">
-                  <a16:creationId xmlns:a16="http://schemas.microsoft.com/office/drawing/2014/main" id="{08451B37-7EDC-4BFE-B499-E022E9814C13}"/>
-                </a:ext>
-              </a:extLst>
-            </p:cNvPr>
-            <p:cNvCxnSpPr>
-              <a:cxnSpLocks/>
-            </p:cNvCxnSpPr>
-            <p:nvPr/>
-          </p:nvCxnSpPr>
-          <p:spPr>
-            <a:xfrm>
-              <a:off x="7628186" y="1605180"/>
-              <a:ext cx="0" cy="701837"/>
-            </a:xfrm>
-            <a:prstGeom prst="line">
-              <a:avLst/>
-            </a:prstGeom>
-          </p:spPr>
-          <p:style>
-            <a:lnRef idx="1">
-              <a:schemeClr val="dk1"/>
-            </a:lnRef>
-            <a:fillRef idx="0">
-              <a:schemeClr val="dk1"/>
-            </a:fillRef>
-            <a:effectRef idx="0">
-              <a:schemeClr val="dk1"/>
-            </a:effectRef>
-            <a:fontRef idx="minor">
-              <a:schemeClr val="tx1"/>
-            </a:fontRef>
-          </p:style>
-        </p:cxnSp>
-        <p:cxnSp>
-          <p:nvCxnSpPr>
-            <p:cNvPr id="37" name="Straight Connector 36">
-              <a:extLst>
-                <a:ext uri="{FF2B5EF4-FFF2-40B4-BE49-F238E27FC236}">
-                  <a16:creationId xmlns:a16="http://schemas.microsoft.com/office/drawing/2014/main" id="{14379D15-E0E1-48ED-9B6F-F6346B399DE8}"/>
-                </a:ext>
-              </a:extLst>
-            </p:cNvPr>
-            <p:cNvCxnSpPr>
-              <a:cxnSpLocks/>
-            </p:cNvCxnSpPr>
-            <p:nvPr/>
-          </p:nvCxnSpPr>
-          <p:spPr>
-            <a:xfrm>
-              <a:off x="6804296" y="1605180"/>
-              <a:ext cx="1" cy="689771"/>
-            </a:xfrm>
-            <a:prstGeom prst="line">
-              <a:avLst/>
-            </a:prstGeom>
-          </p:spPr>
-          <p:style>
-            <a:lnRef idx="1">
-              <a:schemeClr val="dk1"/>
-            </a:lnRef>
-            <a:fillRef idx="0">
-              <a:schemeClr val="dk1"/>
-            </a:fillRef>
-            <a:effectRef idx="0">
-              <a:schemeClr val="dk1"/>
-            </a:effectRef>
-            <a:fontRef idx="minor">
-              <a:schemeClr val="tx1"/>
-            </a:fontRef>
-          </p:style>
-        </p:cxnSp>
-        <p:grpSp>
-          <p:nvGrpSpPr>
-            <p:cNvPr id="54" name="Group 53">
-              <a:extLst>
-                <a:ext uri="{FF2B5EF4-FFF2-40B4-BE49-F238E27FC236}">
-                  <a16:creationId xmlns:a16="http://schemas.microsoft.com/office/drawing/2014/main" id="{C2353071-AE09-4713-A25D-CFAA589A888C}"/>
+                  <a16:creationId xmlns:a16="http://schemas.microsoft.com/office/drawing/2014/main" id="{C2894E0B-196D-4819-B81D-E79A19AA731E}"/>
                 </a:ext>
               </a:extLst>
             </p:cNvPr>
@@ -3436,18 +3360,18 @@
           </p:nvGrpSpPr>
           <p:grpSpPr>
             <a:xfrm>
-              <a:off x="1439694" y="1394668"/>
-              <a:ext cx="7928042" cy="4438204"/>
-              <a:chOff x="1439694" y="1394668"/>
-              <a:chExt cx="7928042" cy="4438204"/>
+              <a:off x="1987129" y="1620113"/>
+              <a:ext cx="6986091" cy="4212759"/>
+              <a:chOff x="1533757" y="1361334"/>
+              <a:chExt cx="7415229" cy="4471538"/>
             </a:xfrm>
           </p:grpSpPr>
           <p:cxnSp>
             <p:nvCxnSpPr>
-              <p:cNvPr id="40" name="Straight Connector 39">
+              <p:cNvPr id="41" name="Straight Connector 40">
                 <a:extLst>
                   <a:ext uri="{FF2B5EF4-FFF2-40B4-BE49-F238E27FC236}">
-                    <a16:creationId xmlns:a16="http://schemas.microsoft.com/office/drawing/2014/main" id="{503F33C3-0F40-422B-AFFC-0A59BCFBFB50}"/>
+                    <a16:creationId xmlns:a16="http://schemas.microsoft.com/office/drawing/2014/main" id="{08451B37-7EDC-4BFE-B499-E022E9814C13}"/>
                   </a:ext>
                 </a:extLst>
               </p:cNvPr>
@@ -3458,8 +3382,8 @@
             </p:nvCxnSpPr>
             <p:spPr>
               <a:xfrm>
-                <a:off x="3070718" y="1604864"/>
-                <a:ext cx="1" cy="689771"/>
+                <a:off x="7628186" y="1605180"/>
+                <a:ext cx="0" cy="701837"/>
               </a:xfrm>
               <a:prstGeom prst="line">
                 <a:avLst/>
@@ -3482,20 +3406,22 @@
           </p:cxnSp>
           <p:cxnSp>
             <p:nvCxnSpPr>
-              <p:cNvPr id="39" name="Straight Connector 38">
+              <p:cNvPr id="37" name="Straight Connector 36">
                 <a:extLst>
                   <a:ext uri="{FF2B5EF4-FFF2-40B4-BE49-F238E27FC236}">
-                    <a16:creationId xmlns:a16="http://schemas.microsoft.com/office/drawing/2014/main" id="{4DF4E654-79BD-42B2-A22E-6BE840DFD846}"/>
+                    <a16:creationId xmlns:a16="http://schemas.microsoft.com/office/drawing/2014/main" id="{14379D15-E0E1-48ED-9B6F-F6346B399DE8}"/>
                   </a:ext>
                 </a:extLst>
               </p:cNvPr>
-              <p:cNvCxnSpPr/>
+              <p:cNvCxnSpPr>
+                <a:cxnSpLocks/>
+              </p:cNvCxnSpPr>
               <p:nvPr/>
             </p:nvCxnSpPr>
             <p:spPr>
-              <a:xfrm flipH="1">
-                <a:off x="7243839" y="5248285"/>
-                <a:ext cx="1" cy="184019"/>
+              <a:xfrm>
+                <a:off x="6804296" y="1605180"/>
+                <a:ext cx="1" cy="689771"/>
               </a:xfrm>
               <a:prstGeom prst="line">
                 <a:avLst/>
@@ -3516,547 +3442,1296 @@
               </a:fontRef>
             </p:style>
           </p:cxnSp>
-          <p:cxnSp>
-            <p:nvCxnSpPr>
-              <p:cNvPr id="6" name="Straight Connector 5">
+          <p:grpSp>
+            <p:nvGrpSpPr>
+              <p:cNvPr id="54" name="Group 53">
                 <a:extLst>
                   <a:ext uri="{FF2B5EF4-FFF2-40B4-BE49-F238E27FC236}">
-                    <a16:creationId xmlns:a16="http://schemas.microsoft.com/office/drawing/2014/main" id="{A9EA7C4C-0DD2-447C-8340-F125988DE62F}"/>
+                    <a16:creationId xmlns:a16="http://schemas.microsoft.com/office/drawing/2014/main" id="{C2353071-AE09-4713-A25D-CFAA589A888C}"/>
                   </a:ext>
                 </a:extLst>
               </p:cNvPr>
-              <p:cNvCxnSpPr>
-                <a:cxnSpLocks/>
-              </p:cNvCxnSpPr>
+              <p:cNvGrpSpPr/>
               <p:nvPr/>
-            </p:nvCxnSpPr>
-            <p:spPr>
+            </p:nvGrpSpPr>
+            <p:grpSpPr>
               <a:xfrm>
-                <a:off x="1439694" y="5253135"/>
-                <a:ext cx="7928042" cy="0"/>
+                <a:off x="1533757" y="1361334"/>
+                <a:ext cx="7415229" cy="4471538"/>
+                <a:chOff x="1533757" y="1361334"/>
+                <a:chExt cx="7415229" cy="4471538"/>
               </a:xfrm>
-              <a:prstGeom prst="line">
-                <a:avLst/>
-              </a:prstGeom>
-              <a:ln w="57150">
+            </p:grpSpPr>
+            <p:cxnSp>
+              <p:nvCxnSpPr>
+                <p:cNvPr id="40" name="Straight Connector 39">
+                  <a:extLst>
+                    <a:ext uri="{FF2B5EF4-FFF2-40B4-BE49-F238E27FC236}">
+                      <a16:creationId xmlns:a16="http://schemas.microsoft.com/office/drawing/2014/main" id="{503F33C3-0F40-422B-AFFC-0A59BCFBFB50}"/>
+                    </a:ext>
+                  </a:extLst>
+                </p:cNvPr>
+                <p:cNvCxnSpPr>
+                  <a:cxnSpLocks/>
+                </p:cNvCxnSpPr>
+                <p:nvPr/>
+              </p:nvCxnSpPr>
+              <p:spPr>
+                <a:xfrm>
+                  <a:off x="3070718" y="1604864"/>
+                  <a:ext cx="1" cy="689771"/>
+                </a:xfrm>
+                <a:prstGeom prst="line">
+                  <a:avLst/>
+                </a:prstGeom>
+              </p:spPr>
+              <p:style>
+                <a:lnRef idx="1">
+                  <a:schemeClr val="dk1"/>
+                </a:lnRef>
+                <a:fillRef idx="0">
+                  <a:schemeClr val="dk1"/>
+                </a:fillRef>
+                <a:effectRef idx="0">
+                  <a:schemeClr val="dk1"/>
+                </a:effectRef>
+                <a:fontRef idx="minor">
+                  <a:schemeClr val="tx1"/>
+                </a:fontRef>
+              </p:style>
+            </p:cxnSp>
+            <p:cxnSp>
+              <p:nvCxnSpPr>
+                <p:cNvPr id="6" name="Straight Connector 5">
+                  <a:extLst>
+                    <a:ext uri="{FF2B5EF4-FFF2-40B4-BE49-F238E27FC236}">
+                      <a16:creationId xmlns:a16="http://schemas.microsoft.com/office/drawing/2014/main" id="{A9EA7C4C-0DD2-447C-8340-F125988DE62F}"/>
+                    </a:ext>
+                  </a:extLst>
+                </p:cNvPr>
+                <p:cNvCxnSpPr>
+                  <a:cxnSpLocks/>
+                </p:cNvCxnSpPr>
+                <p:nvPr/>
+              </p:nvCxnSpPr>
+              <p:spPr>
+                <a:xfrm>
+                  <a:off x="1616432" y="5253135"/>
+                  <a:ext cx="7332554" cy="0"/>
+                </a:xfrm>
+                <a:prstGeom prst="line">
+                  <a:avLst/>
+                </a:prstGeom>
+                <a:ln w="57150">
+                  <a:solidFill>
+                    <a:schemeClr val="tx1"/>
+                  </a:solidFill>
+                </a:ln>
+              </p:spPr>
+              <p:style>
+                <a:lnRef idx="1">
+                  <a:schemeClr val="accent1"/>
+                </a:lnRef>
+                <a:fillRef idx="0">
+                  <a:schemeClr val="accent1"/>
+                </a:fillRef>
+                <a:effectRef idx="0">
+                  <a:schemeClr val="accent1"/>
+                </a:effectRef>
+                <a:fontRef idx="minor">
+                  <a:schemeClr val="tx1"/>
+                </a:fontRef>
+              </p:style>
+            </p:cxnSp>
+            <p:sp>
+              <p:nvSpPr>
+                <p:cNvPr id="7" name="Freeform 6">
+                  <a:extLst>
+                    <a:ext uri="{FF2B5EF4-FFF2-40B4-BE49-F238E27FC236}">
+                      <a16:creationId xmlns:a16="http://schemas.microsoft.com/office/drawing/2014/main" id="{58021AEB-702F-4BE2-BE8C-D90490646ADA}"/>
+                    </a:ext>
+                  </a:extLst>
+                </p:cNvPr>
+                <p:cNvSpPr>
+                  <a:spLocks/>
+                </p:cNvSpPr>
+                <p:nvPr/>
+              </p:nvSpPr>
+              <p:spPr bwMode="auto">
+                <a:xfrm>
+                  <a:off x="2146040" y="2304897"/>
+                  <a:ext cx="1831457" cy="2948238"/>
+                </a:xfrm>
+                <a:custGeom>
+                  <a:avLst/>
+                  <a:gdLst/>
+                  <a:ahLst/>
+                  <a:cxnLst>
+                    <a:cxn ang="0">
+                      <a:pos x="0" y="0"/>
+                    </a:cxn>
+                    <a:cxn ang="0">
+                      <a:pos x="0" y="528"/>
+                    </a:cxn>
+                    <a:cxn ang="0">
+                      <a:pos x="3216" y="528"/>
+                    </a:cxn>
+                    <a:cxn ang="0">
+                      <a:pos x="3216" y="0"/>
+                    </a:cxn>
+                  </a:cxnLst>
+                  <a:rect l="0" t="0" r="r" b="b"/>
+                  <a:pathLst>
+                    <a:path w="3216" h="528">
+                      <a:moveTo>
+                        <a:pt x="0" y="0"/>
+                      </a:moveTo>
+                      <a:lnTo>
+                        <a:pt x="0" y="528"/>
+                      </a:lnTo>
+                      <a:lnTo>
+                        <a:pt x="3216" y="528"/>
+                      </a:lnTo>
+                      <a:lnTo>
+                        <a:pt x="3216" y="0"/>
+                      </a:lnTo>
+                    </a:path>
+                  </a:pathLst>
+                </a:custGeom>
                 <a:solidFill>
+                  <a:schemeClr val="hlink"/>
+                </a:solidFill>
+                <a:ln w="57150" cap="flat" cmpd="sng">
+                  <a:solidFill>
+                    <a:schemeClr val="tx1">
+                      <a:alpha val="78000"/>
+                    </a:schemeClr>
+                  </a:solidFill>
+                  <a:prstDash val="solid"/>
+                  <a:round/>
+                  <a:headEnd type="none" w="lg" len="med"/>
+                  <a:tailEnd type="none" w="lg" len="med"/>
+                </a:ln>
+                <a:effectLst/>
+              </p:spPr>
+              <p:txBody>
+                <a:bodyPr wrap="square" anchor="ctr">
+                  <a:spAutoFit/>
+                </a:bodyPr>
+                <a:lstStyle/>
+                <a:p>
+                  <a:endParaRPr lang="en-US" dirty="0"/>
+                </a:p>
+              </p:txBody>
+            </p:sp>
+            <p:cxnSp>
+              <p:nvCxnSpPr>
+                <p:cNvPr id="19" name="Straight Connector 18">
+                  <a:extLst>
+                    <a:ext uri="{FF2B5EF4-FFF2-40B4-BE49-F238E27FC236}">
+                      <a16:creationId xmlns:a16="http://schemas.microsoft.com/office/drawing/2014/main" id="{CD12D136-1B8D-4819-9342-DB7938625856}"/>
+                    </a:ext>
+                  </a:extLst>
+                </p:cNvPr>
+                <p:cNvCxnSpPr/>
+                <p:nvPr/>
+              </p:nvCxnSpPr>
+              <p:spPr>
+                <a:xfrm>
+                  <a:off x="4267057" y="2304897"/>
+                  <a:ext cx="604663" cy="0"/>
+                </a:xfrm>
+                <a:prstGeom prst="line">
+                  <a:avLst/>
+                </a:prstGeom>
+                <a:ln w="28575">
+                  <a:solidFill>
+                    <a:srgbClr val="FF0000"/>
+                  </a:solidFill>
+                </a:ln>
+              </p:spPr>
+              <p:style>
+                <a:lnRef idx="1">
+                  <a:schemeClr val="accent1"/>
+                </a:lnRef>
+                <a:fillRef idx="0">
+                  <a:schemeClr val="accent1"/>
+                </a:fillRef>
+                <a:effectRef idx="0">
+                  <a:schemeClr val="accent1"/>
+                </a:effectRef>
+                <a:fontRef idx="minor">
                   <a:schemeClr val="tx1"/>
+                </a:fontRef>
+              </p:style>
+            </p:cxnSp>
+            <p:cxnSp>
+              <p:nvCxnSpPr>
+                <p:cNvPr id="20" name="Straight Connector 19">
+                  <a:extLst>
+                    <a:ext uri="{FF2B5EF4-FFF2-40B4-BE49-F238E27FC236}">
+                      <a16:creationId xmlns:a16="http://schemas.microsoft.com/office/drawing/2014/main" id="{36825B29-9467-409D-960E-0015624CE2F1}"/>
+                    </a:ext>
+                  </a:extLst>
+                </p:cNvPr>
+                <p:cNvCxnSpPr/>
+                <p:nvPr/>
+              </p:nvCxnSpPr>
+              <p:spPr>
+                <a:xfrm>
+                  <a:off x="5184140" y="2304044"/>
+                  <a:ext cx="604663" cy="0"/>
+                </a:xfrm>
+                <a:prstGeom prst="line">
+                  <a:avLst/>
+                </a:prstGeom>
+                <a:ln w="28575">
+                  <a:solidFill>
+                    <a:srgbClr val="FF0000"/>
+                  </a:solidFill>
+                </a:ln>
+              </p:spPr>
+              <p:style>
+                <a:lnRef idx="1">
+                  <a:schemeClr val="accent1"/>
+                </a:lnRef>
+                <a:fillRef idx="0">
+                  <a:schemeClr val="accent1"/>
+                </a:fillRef>
+                <a:effectRef idx="0">
+                  <a:schemeClr val="accent1"/>
+                </a:effectRef>
+                <a:fontRef idx="minor">
+                  <a:schemeClr val="tx1"/>
+                </a:fontRef>
+              </p:style>
+            </p:cxnSp>
+            <p:cxnSp>
+              <p:nvCxnSpPr>
+                <p:cNvPr id="21" name="Straight Connector 20">
+                  <a:extLst>
+                    <a:ext uri="{FF2B5EF4-FFF2-40B4-BE49-F238E27FC236}">
+                      <a16:creationId xmlns:a16="http://schemas.microsoft.com/office/drawing/2014/main" id="{9B3030BC-8E03-47F5-9DC2-0431DC1BFA87}"/>
+                    </a:ext>
+                  </a:extLst>
+                </p:cNvPr>
+                <p:cNvCxnSpPr/>
+                <p:nvPr/>
+              </p:nvCxnSpPr>
+              <p:spPr>
+                <a:xfrm>
+                  <a:off x="6101137" y="2304044"/>
+                  <a:ext cx="604663" cy="0"/>
+                </a:xfrm>
+                <a:prstGeom prst="line">
+                  <a:avLst/>
+                </a:prstGeom>
+                <a:ln w="28575">
+                  <a:solidFill>
+                    <a:srgbClr val="FF0000"/>
+                  </a:solidFill>
+                </a:ln>
+              </p:spPr>
+              <p:style>
+                <a:lnRef idx="1">
+                  <a:schemeClr val="accent1"/>
+                </a:lnRef>
+                <a:fillRef idx="0">
+                  <a:schemeClr val="accent1"/>
+                </a:fillRef>
+                <a:effectRef idx="0">
+                  <a:schemeClr val="accent1"/>
+                </a:effectRef>
+                <a:fontRef idx="minor">
+                  <a:schemeClr val="tx1"/>
+                </a:fontRef>
+              </p:style>
+            </p:cxnSp>
+            <p:cxnSp>
+              <p:nvCxnSpPr>
+                <p:cNvPr id="22" name="Straight Connector 21">
+                  <a:extLst>
+                    <a:ext uri="{FF2B5EF4-FFF2-40B4-BE49-F238E27FC236}">
+                      <a16:creationId xmlns:a16="http://schemas.microsoft.com/office/drawing/2014/main" id="{C89E168E-ADBF-454F-BB89-8A628292715A}"/>
+                    </a:ext>
+                  </a:extLst>
+                </p:cNvPr>
+                <p:cNvCxnSpPr/>
+                <p:nvPr/>
+              </p:nvCxnSpPr>
+              <p:spPr>
+                <a:xfrm>
+                  <a:off x="7007917" y="2304044"/>
+                  <a:ext cx="604663" cy="0"/>
+                </a:xfrm>
+                <a:prstGeom prst="line">
+                  <a:avLst/>
+                </a:prstGeom>
+                <a:ln w="28575">
+                  <a:solidFill>
+                    <a:srgbClr val="FF0000"/>
+                  </a:solidFill>
+                </a:ln>
+              </p:spPr>
+              <p:style>
+                <a:lnRef idx="1">
+                  <a:schemeClr val="accent1"/>
+                </a:lnRef>
+                <a:fillRef idx="0">
+                  <a:schemeClr val="accent1"/>
+                </a:fillRef>
+                <a:effectRef idx="0">
+                  <a:schemeClr val="accent1"/>
+                </a:effectRef>
+                <a:fontRef idx="minor">
+                  <a:schemeClr val="tx1"/>
+                </a:fontRef>
+              </p:style>
+            </p:cxnSp>
+            <p:cxnSp>
+              <p:nvCxnSpPr>
+                <p:cNvPr id="23" name="Straight Connector 22">
+                  <a:extLst>
+                    <a:ext uri="{FF2B5EF4-FFF2-40B4-BE49-F238E27FC236}">
+                      <a16:creationId xmlns:a16="http://schemas.microsoft.com/office/drawing/2014/main" id="{AC2E2D4A-8DD2-4B77-8B9A-848BFCE4D606}"/>
+                    </a:ext>
+                  </a:extLst>
+                </p:cNvPr>
+                <p:cNvCxnSpPr/>
+                <p:nvPr/>
+              </p:nvCxnSpPr>
+              <p:spPr>
+                <a:xfrm>
+                  <a:off x="7922317" y="2299228"/>
+                  <a:ext cx="604663" cy="0"/>
+                </a:xfrm>
+                <a:prstGeom prst="line">
+                  <a:avLst/>
+                </a:prstGeom>
+                <a:ln w="28575">
+                  <a:solidFill>
+                    <a:srgbClr val="FF0000"/>
+                  </a:solidFill>
+                </a:ln>
+              </p:spPr>
+              <p:style>
+                <a:lnRef idx="1">
+                  <a:schemeClr val="accent1"/>
+                </a:lnRef>
+                <a:fillRef idx="0">
+                  <a:schemeClr val="accent1"/>
+                </a:fillRef>
+                <a:effectRef idx="0">
+                  <a:schemeClr val="accent1"/>
+                </a:effectRef>
+                <a:fontRef idx="minor">
+                  <a:schemeClr val="tx1"/>
+                </a:fontRef>
+              </p:style>
+            </p:cxnSp>
+            <p:cxnSp>
+              <p:nvCxnSpPr>
+                <p:cNvPr id="24" name="Straight Connector 23">
+                  <a:extLst>
+                    <a:ext uri="{FF2B5EF4-FFF2-40B4-BE49-F238E27FC236}">
+                      <a16:creationId xmlns:a16="http://schemas.microsoft.com/office/drawing/2014/main" id="{4C3BC8D4-DF42-46E8-BC95-659901EFA2C7}"/>
+                    </a:ext>
+                  </a:extLst>
+                </p:cNvPr>
+                <p:cNvCxnSpPr/>
+                <p:nvPr/>
+              </p:nvCxnSpPr>
+              <p:spPr>
+                <a:xfrm>
+                  <a:off x="3359712" y="2299228"/>
+                  <a:ext cx="604663" cy="0"/>
+                </a:xfrm>
+                <a:prstGeom prst="line">
+                  <a:avLst/>
+                </a:prstGeom>
+                <a:ln w="28575">
+                  <a:solidFill>
+                    <a:srgbClr val="FF0000"/>
+                  </a:solidFill>
+                </a:ln>
+              </p:spPr>
+              <p:style>
+                <a:lnRef idx="1">
+                  <a:schemeClr val="accent1"/>
+                </a:lnRef>
+                <a:fillRef idx="0">
+                  <a:schemeClr val="accent1"/>
+                </a:fillRef>
+                <a:effectRef idx="0">
+                  <a:schemeClr val="accent1"/>
+                </a:effectRef>
+                <a:fontRef idx="minor">
+                  <a:schemeClr val="tx1"/>
+                </a:fontRef>
+              </p:style>
+            </p:cxnSp>
+            <p:cxnSp>
+              <p:nvCxnSpPr>
+                <p:cNvPr id="25" name="Straight Connector 24">
+                  <a:extLst>
+                    <a:ext uri="{FF2B5EF4-FFF2-40B4-BE49-F238E27FC236}">
+                      <a16:creationId xmlns:a16="http://schemas.microsoft.com/office/drawing/2014/main" id="{66D0DB74-2689-4A1E-9AA0-0E42392816FC}"/>
+                    </a:ext>
+                  </a:extLst>
+                </p:cNvPr>
+                <p:cNvCxnSpPr/>
+                <p:nvPr/>
+              </p:nvCxnSpPr>
+              <p:spPr>
+                <a:xfrm>
+                  <a:off x="2452932" y="2299228"/>
+                  <a:ext cx="604663" cy="0"/>
+                </a:xfrm>
+                <a:prstGeom prst="line">
+                  <a:avLst/>
+                </a:prstGeom>
+                <a:ln w="28575">
+                  <a:solidFill>
+                    <a:srgbClr val="FF0000"/>
+                  </a:solidFill>
+                </a:ln>
+              </p:spPr>
+              <p:style>
+                <a:lnRef idx="1">
+                  <a:schemeClr val="accent1"/>
+                </a:lnRef>
+                <a:fillRef idx="0">
+                  <a:schemeClr val="accent1"/>
+                </a:fillRef>
+                <a:effectRef idx="0">
+                  <a:schemeClr val="accent1"/>
+                </a:effectRef>
+                <a:fontRef idx="minor">
+                  <a:schemeClr val="tx1"/>
+                </a:fontRef>
+              </p:style>
+            </p:cxnSp>
+            <p:cxnSp>
+              <p:nvCxnSpPr>
+                <p:cNvPr id="26" name="Straight Connector 25">
+                  <a:extLst>
+                    <a:ext uri="{FF2B5EF4-FFF2-40B4-BE49-F238E27FC236}">
+                      <a16:creationId xmlns:a16="http://schemas.microsoft.com/office/drawing/2014/main" id="{3EFCB8FE-B858-4B0A-8B35-B9432A3D6149}"/>
+                    </a:ext>
+                  </a:extLst>
+                </p:cNvPr>
+                <p:cNvCxnSpPr/>
+                <p:nvPr/>
+              </p:nvCxnSpPr>
+              <p:spPr>
+                <a:xfrm>
+                  <a:off x="1533757" y="2299228"/>
+                  <a:ext cx="604663" cy="0"/>
+                </a:xfrm>
+                <a:prstGeom prst="line">
+                  <a:avLst/>
+                </a:prstGeom>
+                <a:ln w="28575">
+                  <a:solidFill>
+                    <a:srgbClr val="FF0000"/>
+                  </a:solidFill>
+                </a:ln>
+              </p:spPr>
+              <p:style>
+                <a:lnRef idx="1">
+                  <a:schemeClr val="accent1"/>
+                </a:lnRef>
+                <a:fillRef idx="0">
+                  <a:schemeClr val="accent1"/>
+                </a:fillRef>
+                <a:effectRef idx="0">
+                  <a:schemeClr val="accent1"/>
+                </a:effectRef>
+                <a:fontRef idx="minor">
+                  <a:schemeClr val="tx1"/>
+                </a:fontRef>
+              </p:style>
+            </p:cxnSp>
+            <p:cxnSp>
+              <p:nvCxnSpPr>
+                <p:cNvPr id="29" name="Straight Arrow Connector 28">
+                  <a:extLst>
+                    <a:ext uri="{FF2B5EF4-FFF2-40B4-BE49-F238E27FC236}">
+                      <a16:creationId xmlns:a16="http://schemas.microsoft.com/office/drawing/2014/main" id="{F722C922-5779-4187-A3E8-D78E77F764F0}"/>
+                    </a:ext>
+                  </a:extLst>
+                </p:cNvPr>
+                <p:cNvCxnSpPr/>
+                <p:nvPr/>
+              </p:nvCxnSpPr>
+              <p:spPr>
+                <a:xfrm>
+                  <a:off x="8526980" y="2299228"/>
+                  <a:ext cx="0" cy="2949057"/>
+                </a:xfrm>
+                <a:prstGeom prst="straightConnector1">
+                  <a:avLst/>
+                </a:prstGeom>
+                <a:ln w="19050">
+                  <a:solidFill>
+                    <a:schemeClr val="tx1"/>
+                  </a:solidFill>
+                  <a:headEnd type="triangle" w="lg" len="lg"/>
+                  <a:tailEnd type="triangle" w="lg" len="lg"/>
+                </a:ln>
+              </p:spPr>
+              <p:style>
+                <a:lnRef idx="1">
+                  <a:schemeClr val="accent1"/>
+                </a:lnRef>
+                <a:fillRef idx="0">
+                  <a:schemeClr val="accent1"/>
+                </a:fillRef>
+                <a:effectRef idx="0">
+                  <a:schemeClr val="accent1"/>
+                </a:effectRef>
+                <a:fontRef idx="minor">
+                  <a:schemeClr val="tx1"/>
+                </a:fontRef>
+              </p:style>
+            </p:cxnSp>
+            <p:sp>
+              <p:nvSpPr>
+                <p:cNvPr id="27" name="TextBox 26">
+                  <a:extLst>
+                    <a:ext uri="{FF2B5EF4-FFF2-40B4-BE49-F238E27FC236}">
+                      <a16:creationId xmlns:a16="http://schemas.microsoft.com/office/drawing/2014/main" id="{A657B6E9-1301-4DD7-9ED5-5184F2D8624C}"/>
+                    </a:ext>
+                  </a:extLst>
+                </p:cNvPr>
+                <p:cNvSpPr txBox="1"/>
+                <p:nvPr/>
+              </p:nvSpPr>
+              <p:spPr>
+                <a:xfrm>
+                  <a:off x="8065411" y="3499923"/>
+                  <a:ext cx="883575" cy="369332"/>
+                </a:xfrm>
+                <a:prstGeom prst="rect">
+                  <a:avLst/>
+                </a:prstGeom>
+                <a:solidFill>
+                  <a:schemeClr val="bg1"/>
                 </a:solidFill>
-              </a:ln>
-            </p:spPr>
-            <p:style>
-              <a:lnRef idx="1">
-                <a:schemeClr val="accent1"/>
-              </a:lnRef>
-              <a:fillRef idx="0">
-                <a:schemeClr val="accent1"/>
-              </a:fillRef>
-              <a:effectRef idx="0">
-                <a:schemeClr val="accent1"/>
-              </a:effectRef>
-              <a:fontRef idx="minor">
-                <a:schemeClr val="tx1"/>
-              </a:fontRef>
-            </p:style>
-          </p:cxnSp>
+              </p:spPr>
+              <p:txBody>
+                <a:bodyPr wrap="none" rtlCol="0">
+                  <a:spAutoFit/>
+                </a:bodyPr>
+                <a:lstStyle/>
+                <a:p>
+                  <a:r>
+                    <a:rPr lang="en-US" dirty="0">
+                      <a:latin typeface="Times New Roman" panose="02020603050405020304" pitchFamily="18" charset="0"/>
+                      <a:cs typeface="Times New Roman" panose="02020603050405020304" pitchFamily="18" charset="0"/>
+                    </a:rPr>
+                    <a:t>1 meter</a:t>
+                  </a:r>
+                </a:p>
+              </p:txBody>
+            </p:sp>
+            <p:sp>
+              <p:nvSpPr>
+                <p:cNvPr id="35" name="Oval 34">
+                  <a:extLst>
+                    <a:ext uri="{FF2B5EF4-FFF2-40B4-BE49-F238E27FC236}">
+                      <a16:creationId xmlns:a16="http://schemas.microsoft.com/office/drawing/2014/main" id="{EA246440-DD76-4A9D-8AB9-FE1F7B5B9DD6}"/>
+                    </a:ext>
+                  </a:extLst>
+                </p:cNvPr>
+                <p:cNvSpPr/>
+                <p:nvPr/>
+              </p:nvSpPr>
+              <p:spPr bwMode="auto">
+                <a:xfrm>
+                  <a:off x="2982691" y="5129714"/>
+                  <a:ext cx="149807" cy="149807"/>
+                </a:xfrm>
+                <a:prstGeom prst="ellipse">
+                  <a:avLst/>
+                </a:prstGeom>
+                <a:solidFill>
+                  <a:srgbClr val="C00000"/>
+                </a:solidFill>
+                <a:ln w="12700" cap="flat" cmpd="sng" algn="ctr">
+                  <a:solidFill>
+                    <a:srgbClr val="C00000"/>
+                  </a:solidFill>
+                  <a:prstDash val="solid"/>
+                  <a:round/>
+                  <a:headEnd type="none" w="lg" len="med"/>
+                  <a:tailEnd type="none" w="lg" len="med"/>
+                </a:ln>
+                <a:effectLst/>
+              </p:spPr>
+              <p:txBody>
+                <a:bodyPr vert="horz" wrap="square" lIns="91440" tIns="45720" rIns="91440" bIns="45720" numCol="1" rtlCol="0" anchor="ctr" anchorCtr="0" compatLnSpc="1">
+                  <a:prstTxWarp prst="textNoShape">
+                    <a:avLst/>
+                  </a:prstTxWarp>
+                  <a:spAutoFit/>
+                </a:bodyPr>
+                <a:lstStyle/>
+                <a:p>
+                  <a:pPr marL="0" marR="0" indent="0" algn="l" defTabSz="914400" rtl="0" eaLnBrk="1" fontAlgn="base" latinLnBrk="0" hangingPunct="1">
+                    <a:lnSpc>
+                      <a:spcPct val="100000"/>
+                    </a:lnSpc>
+                    <a:spcBef>
+                      <a:spcPct val="0"/>
+                    </a:spcBef>
+                    <a:spcAft>
+                      <a:spcPct val="0"/>
+                    </a:spcAft>
+                    <a:buClrTx/>
+                    <a:buSzTx/>
+                    <a:buFontTx/>
+                    <a:buNone/>
+                    <a:tabLst/>
+                  </a:pPr>
+                  <a:endParaRPr kumimoji="0" lang="en-US" sz="1800" b="0" i="0" u="none" strike="noStrike" cap="none" normalizeH="0" baseline="0">
+                    <a:ln>
+                      <a:noFill/>
+                    </a:ln>
+                    <a:solidFill>
+                      <a:schemeClr val="tx1"/>
+                    </a:solidFill>
+                    <a:effectLst/>
+                    <a:latin typeface="Century Gothic" pitchFamily="34" charset="0"/>
+                    <a:cs typeface="Arial" charset="0"/>
+                  </a:endParaRPr>
+                </a:p>
+              </p:txBody>
+            </p:sp>
+            <p:sp>
+              <p:nvSpPr>
+                <p:cNvPr id="36" name="Oval 35">
+                  <a:extLst>
+                    <a:ext uri="{FF2B5EF4-FFF2-40B4-BE49-F238E27FC236}">
+                      <a16:creationId xmlns:a16="http://schemas.microsoft.com/office/drawing/2014/main" id="{B636916F-E631-43D5-AFCF-FB0EFA6E981D}"/>
+                    </a:ext>
+                  </a:extLst>
+                </p:cNvPr>
+                <p:cNvSpPr/>
+                <p:nvPr/>
+              </p:nvSpPr>
+              <p:spPr bwMode="auto">
+                <a:xfrm>
+                  <a:off x="2992569" y="2224324"/>
+                  <a:ext cx="149807" cy="149807"/>
+                </a:xfrm>
+                <a:prstGeom prst="ellipse">
+                  <a:avLst/>
+                </a:prstGeom>
+                <a:solidFill>
+                  <a:srgbClr val="C00000"/>
+                </a:solidFill>
+                <a:ln w="12700" cap="flat" cmpd="sng" algn="ctr">
+                  <a:solidFill>
+                    <a:srgbClr val="C00000"/>
+                  </a:solidFill>
+                  <a:prstDash val="solid"/>
+                  <a:round/>
+                  <a:headEnd type="none" w="lg" len="med"/>
+                  <a:tailEnd type="none" w="lg" len="med"/>
+                </a:ln>
+                <a:effectLst/>
+              </p:spPr>
+              <p:txBody>
+                <a:bodyPr vert="horz" wrap="square" lIns="91440" tIns="45720" rIns="91440" bIns="45720" numCol="1" rtlCol="0" anchor="ctr" anchorCtr="0" compatLnSpc="1">
+                  <a:prstTxWarp prst="textNoShape">
+                    <a:avLst/>
+                  </a:prstTxWarp>
+                  <a:spAutoFit/>
+                </a:bodyPr>
+                <a:lstStyle/>
+                <a:p>
+                  <a:pPr marL="0" marR="0" indent="0" algn="l" defTabSz="914400" rtl="0" eaLnBrk="1" fontAlgn="base" latinLnBrk="0" hangingPunct="1">
+                    <a:lnSpc>
+                      <a:spcPct val="100000"/>
+                    </a:lnSpc>
+                    <a:spcBef>
+                      <a:spcPct val="0"/>
+                    </a:spcBef>
+                    <a:spcAft>
+                      <a:spcPct val="0"/>
+                    </a:spcAft>
+                    <a:buClrTx/>
+                    <a:buSzTx/>
+                    <a:buFontTx/>
+                    <a:buNone/>
+                    <a:tabLst/>
+                  </a:pPr>
+                  <a:endParaRPr kumimoji="0" lang="en-US" sz="1800" b="0" i="0" u="none" strike="noStrike" cap="none" normalizeH="0" baseline="0">
+                    <a:ln>
+                      <a:noFill/>
+                    </a:ln>
+                    <a:solidFill>
+                      <a:schemeClr val="tx1"/>
+                    </a:solidFill>
+                    <a:effectLst/>
+                    <a:latin typeface="Century Gothic" pitchFamily="34" charset="0"/>
+                    <a:cs typeface="Arial" charset="0"/>
+                  </a:endParaRPr>
+                </a:p>
+              </p:txBody>
+            </p:sp>
+            <p:cxnSp>
+              <p:nvCxnSpPr>
+                <p:cNvPr id="38" name="Straight Connector 37">
+                  <a:extLst>
+                    <a:ext uri="{FF2B5EF4-FFF2-40B4-BE49-F238E27FC236}">
+                      <a16:creationId xmlns:a16="http://schemas.microsoft.com/office/drawing/2014/main" id="{A73CFDDE-A54D-4C47-93ED-C83A5CBFF56A}"/>
+                    </a:ext>
+                  </a:extLst>
+                </p:cNvPr>
+                <p:cNvCxnSpPr>
+                  <a:stCxn id="35" idx="4"/>
+                </p:cNvCxnSpPr>
+                <p:nvPr/>
+              </p:nvCxnSpPr>
+              <p:spPr>
+                <a:xfrm flipH="1">
+                  <a:off x="3057594" y="5279521"/>
+                  <a:ext cx="1" cy="184019"/>
+                </a:xfrm>
+                <a:prstGeom prst="line">
+                  <a:avLst/>
+                </a:prstGeom>
+              </p:spPr>
+              <p:style>
+                <a:lnRef idx="1">
+                  <a:schemeClr val="dk1"/>
+                </a:lnRef>
+                <a:fillRef idx="0">
+                  <a:schemeClr val="dk1"/>
+                </a:fillRef>
+                <a:effectRef idx="0">
+                  <a:schemeClr val="dk1"/>
+                </a:effectRef>
+                <a:fontRef idx="minor">
+                  <a:schemeClr val="tx1"/>
+                </a:fontRef>
+              </p:style>
+            </p:cxnSp>
+            <p:grpSp>
+              <p:nvGrpSpPr>
+                <p:cNvPr id="12" name="Group 11">
+                  <a:extLst>
+                    <a:ext uri="{FF2B5EF4-FFF2-40B4-BE49-F238E27FC236}">
+                      <a16:creationId xmlns:a16="http://schemas.microsoft.com/office/drawing/2014/main" id="{AA99E7F0-9391-4D18-ADB3-3BE01FBAD3B1}"/>
+                    </a:ext>
+                  </a:extLst>
+                </p:cNvPr>
+                <p:cNvGrpSpPr/>
+                <p:nvPr/>
+              </p:nvGrpSpPr>
+              <p:grpSpPr>
+                <a:xfrm>
+                  <a:off x="3183114" y="2045186"/>
+                  <a:ext cx="595784" cy="519420"/>
+                  <a:chOff x="6545089" y="2384266"/>
+                  <a:chExt cx="210233" cy="193882"/>
+                </a:xfrm>
+              </p:grpSpPr>
+              <p:sp>
+                <p:nvSpPr>
+                  <p:cNvPr id="8" name="AutoShape 174">
+                    <a:extLst>
+                      <a:ext uri="{FF2B5EF4-FFF2-40B4-BE49-F238E27FC236}">
+                        <a16:creationId xmlns:a16="http://schemas.microsoft.com/office/drawing/2014/main" id="{826416CD-FFFE-46F3-BF71-6458DB2A561D}"/>
+                      </a:ext>
+                    </a:extLst>
+                  </p:cNvPr>
+                  <p:cNvSpPr>
+                    <a:spLocks noChangeArrowheads="1"/>
+                  </p:cNvSpPr>
+                  <p:nvPr/>
+                </p:nvSpPr>
+                <p:spPr bwMode="auto">
+                  <a:xfrm flipV="1">
+                    <a:off x="6571368" y="2384266"/>
+                    <a:ext cx="157675" cy="105156"/>
+                  </a:xfrm>
+                  <a:prstGeom prst="triangle">
+                    <a:avLst>
+                      <a:gd name="adj" fmla="val 50000"/>
+                    </a:avLst>
+                  </a:prstGeom>
+                  <a:noFill/>
+                  <a:ln w="12700">
+                    <a:solidFill>
+                      <a:schemeClr val="tx1"/>
+                    </a:solidFill>
+                    <a:miter lim="800000"/>
+                    <a:headEnd type="none" w="lg" len="med"/>
+                    <a:tailEnd type="none" w="lg" len="med"/>
+                  </a:ln>
+                  <a:effectLst/>
+                </p:spPr>
+                <p:txBody>
+                  <a:bodyPr anchor="ctr">
+                    <a:spAutoFit/>
+                  </a:bodyPr>
+                  <a:lstStyle/>
+                  <a:p>
+                    <a:endParaRPr lang="en-US"/>
+                  </a:p>
+                </p:txBody>
+              </p:sp>
+              <p:sp>
+                <p:nvSpPr>
+                  <p:cNvPr id="9" name="Line 175">
+                    <a:extLst>
+                      <a:ext uri="{FF2B5EF4-FFF2-40B4-BE49-F238E27FC236}">
+                        <a16:creationId xmlns:a16="http://schemas.microsoft.com/office/drawing/2014/main" id="{69E53567-22C4-4D37-B119-33F14895647C}"/>
+                      </a:ext>
+                    </a:extLst>
+                  </p:cNvPr>
+                  <p:cNvSpPr>
+                    <a:spLocks noChangeShapeType="1"/>
+                  </p:cNvSpPr>
+                  <p:nvPr/>
+                </p:nvSpPr>
+                <p:spPr bwMode="auto">
+                  <a:xfrm>
+                    <a:off x="6545089" y="2518997"/>
+                    <a:ext cx="210233" cy="0"/>
+                  </a:xfrm>
+                  <a:prstGeom prst="line">
+                    <a:avLst/>
+                  </a:prstGeom>
+                  <a:noFill/>
+                  <a:ln w="12700">
+                    <a:solidFill>
+                      <a:schemeClr val="tx1"/>
+                    </a:solidFill>
+                    <a:round/>
+                    <a:headEnd type="none" w="lg" len="med"/>
+                    <a:tailEnd type="none" w="lg" len="med"/>
+                  </a:ln>
+                  <a:effectLst/>
+                </p:spPr>
+                <p:txBody>
+                  <a:bodyPr anchor="ctr">
+                    <a:spAutoFit/>
+                  </a:bodyPr>
+                  <a:lstStyle/>
+                  <a:p>
+                    <a:endParaRPr lang="en-US"/>
+                  </a:p>
+                </p:txBody>
+              </p:sp>
+              <p:sp>
+                <p:nvSpPr>
+                  <p:cNvPr id="10" name="Line 176">
+                    <a:extLst>
+                      <a:ext uri="{FF2B5EF4-FFF2-40B4-BE49-F238E27FC236}">
+                        <a16:creationId xmlns:a16="http://schemas.microsoft.com/office/drawing/2014/main" id="{514E9AFB-CF9B-49C4-A21C-6AB30C91B677}"/>
+                      </a:ext>
+                    </a:extLst>
+                  </p:cNvPr>
+                  <p:cNvSpPr>
+                    <a:spLocks noChangeShapeType="1"/>
+                  </p:cNvSpPr>
+                  <p:nvPr/>
+                </p:nvSpPr>
+                <p:spPr bwMode="auto">
+                  <a:xfrm>
+                    <a:off x="6571368" y="2548573"/>
+                    <a:ext cx="157675" cy="0"/>
+                  </a:xfrm>
+                  <a:prstGeom prst="line">
+                    <a:avLst/>
+                  </a:prstGeom>
+                  <a:noFill/>
+                  <a:ln w="12700">
+                    <a:solidFill>
+                      <a:schemeClr val="tx1"/>
+                    </a:solidFill>
+                    <a:round/>
+                    <a:headEnd type="none" w="lg" len="med"/>
+                    <a:tailEnd type="none" w="lg" len="med"/>
+                  </a:ln>
+                  <a:effectLst/>
+                </p:spPr>
+                <p:txBody>
+                  <a:bodyPr anchor="ctr">
+                    <a:spAutoFit/>
+                  </a:bodyPr>
+                  <a:lstStyle/>
+                  <a:p>
+                    <a:endParaRPr lang="en-US"/>
+                  </a:p>
+                </p:txBody>
+              </p:sp>
+              <p:sp>
+                <p:nvSpPr>
+                  <p:cNvPr id="11" name="Line 177">
+                    <a:extLst>
+                      <a:ext uri="{FF2B5EF4-FFF2-40B4-BE49-F238E27FC236}">
+                        <a16:creationId xmlns:a16="http://schemas.microsoft.com/office/drawing/2014/main" id="{D3338B02-509F-4D1D-AFAE-EDDBF99A0DD1}"/>
+                      </a:ext>
+                    </a:extLst>
+                  </p:cNvPr>
+                  <p:cNvSpPr>
+                    <a:spLocks noChangeShapeType="1"/>
+                  </p:cNvSpPr>
+                  <p:nvPr/>
+                </p:nvSpPr>
+                <p:spPr bwMode="auto">
+                  <a:xfrm>
+                    <a:off x="6602027" y="2578148"/>
+                    <a:ext cx="95262" cy="0"/>
+                  </a:xfrm>
+                  <a:prstGeom prst="line">
+                    <a:avLst/>
+                  </a:prstGeom>
+                  <a:noFill/>
+                  <a:ln w="12700">
+                    <a:solidFill>
+                      <a:schemeClr val="tx1"/>
+                    </a:solidFill>
+                    <a:round/>
+                    <a:headEnd type="none" w="lg" len="med"/>
+                    <a:tailEnd type="none" w="lg" len="med"/>
+                  </a:ln>
+                  <a:effectLst/>
+                </p:spPr>
+                <p:txBody>
+                  <a:bodyPr anchor="ctr">
+                    <a:spAutoFit/>
+                  </a:bodyPr>
+                  <a:lstStyle/>
+                  <a:p>
+                    <a:endParaRPr lang="en-US"/>
+                  </a:p>
+                </p:txBody>
+              </p:sp>
+            </p:grpSp>
+            <p:sp>
+              <p:nvSpPr>
+                <p:cNvPr id="42" name="TextBox 41">
+                  <a:extLst>
+                    <a:ext uri="{FF2B5EF4-FFF2-40B4-BE49-F238E27FC236}">
+                      <a16:creationId xmlns:a16="http://schemas.microsoft.com/office/drawing/2014/main" id="{BA92C151-C849-4CCB-BFD0-5973E5E417DE}"/>
+                    </a:ext>
+                  </a:extLst>
+                </p:cNvPr>
+                <p:cNvSpPr txBox="1"/>
+                <p:nvPr/>
+              </p:nvSpPr>
+              <p:spPr>
+                <a:xfrm>
+                  <a:off x="6029402" y="5460438"/>
+                  <a:ext cx="2428870" cy="369332"/>
+                </a:xfrm>
+                <a:prstGeom prst="rect">
+                  <a:avLst/>
+                </a:prstGeom>
+                <a:solidFill>
+                  <a:schemeClr val="bg1"/>
+                </a:solidFill>
+              </p:spPr>
+              <p:txBody>
+                <a:bodyPr wrap="none" rtlCol="0">
+                  <a:spAutoFit/>
+                </a:bodyPr>
+                <a:lstStyle/>
+                <a:p>
+                  <a:r>
+                    <a:rPr lang="en-US" dirty="0">
+                      <a:latin typeface="Times New Roman" panose="02020603050405020304" pitchFamily="18" charset="0"/>
+                      <a:cs typeface="Times New Roman" panose="02020603050405020304" pitchFamily="18" charset="0"/>
+                    </a:rPr>
+                    <a:t>1 meter of velocity head</a:t>
+                  </a:r>
+                </a:p>
+              </p:txBody>
+            </p:sp>
+            <p:sp>
+              <p:nvSpPr>
+                <p:cNvPr id="43" name="TextBox 42">
+                  <a:extLst>
+                    <a:ext uri="{FF2B5EF4-FFF2-40B4-BE49-F238E27FC236}">
+                      <a16:creationId xmlns:a16="http://schemas.microsoft.com/office/drawing/2014/main" id="{F8B4DFB6-15DB-4E5B-B514-1CFBDF2ED0EA}"/>
+                    </a:ext>
+                  </a:extLst>
+                </p:cNvPr>
+                <p:cNvSpPr txBox="1"/>
+                <p:nvPr/>
+              </p:nvSpPr>
+              <p:spPr>
+                <a:xfrm>
+                  <a:off x="1838187" y="5463540"/>
+                  <a:ext cx="2454518" cy="369332"/>
+                </a:xfrm>
+                <a:prstGeom prst="rect">
+                  <a:avLst/>
+                </a:prstGeom>
+                <a:solidFill>
+                  <a:schemeClr val="bg1"/>
+                </a:solidFill>
+              </p:spPr>
+              <p:txBody>
+                <a:bodyPr wrap="none" rtlCol="0">
+                  <a:spAutoFit/>
+                </a:bodyPr>
+                <a:lstStyle/>
+                <a:p>
+                  <a:r>
+                    <a:rPr lang="en-US" dirty="0">
+                      <a:latin typeface="Times New Roman" panose="02020603050405020304" pitchFamily="18" charset="0"/>
+                      <a:cs typeface="Times New Roman" panose="02020603050405020304" pitchFamily="18" charset="0"/>
+                    </a:rPr>
+                    <a:t>1 meter of pressure head</a:t>
+                  </a:r>
+                </a:p>
+              </p:txBody>
+            </p:sp>
+            <p:sp>
+              <p:nvSpPr>
+                <p:cNvPr id="44" name="TextBox 43">
+                  <a:extLst>
+                    <a:ext uri="{FF2B5EF4-FFF2-40B4-BE49-F238E27FC236}">
+                      <a16:creationId xmlns:a16="http://schemas.microsoft.com/office/drawing/2014/main" id="{543BB2FE-D7D0-402C-948C-BAF371D9E1B7}"/>
+                    </a:ext>
+                  </a:extLst>
+                </p:cNvPr>
+                <p:cNvSpPr txBox="1"/>
+                <p:nvPr/>
+              </p:nvSpPr>
+              <p:spPr>
+                <a:xfrm>
+                  <a:off x="3523847" y="1361334"/>
+                  <a:ext cx="3280445" cy="456264"/>
+                </a:xfrm>
+                <a:prstGeom prst="rect">
+                  <a:avLst/>
+                </a:prstGeom>
+                <a:solidFill>
+                  <a:schemeClr val="bg1"/>
+                </a:solidFill>
+              </p:spPr>
+              <p:txBody>
+                <a:bodyPr wrap="square" rtlCol="0">
+                  <a:spAutoFit/>
+                </a:bodyPr>
+                <a:lstStyle/>
+                <a:p>
+                  <a:r>
+                    <a:rPr lang="en-US" dirty="0">
+                      <a:latin typeface="Times New Roman" panose="02020603050405020304" pitchFamily="18" charset="0"/>
+                      <a:cs typeface="Times New Roman" panose="02020603050405020304" pitchFamily="18" charset="0"/>
+                    </a:rPr>
+                    <a:t>1 meter of elevation head</a:t>
+                  </a:r>
+                </a:p>
+              </p:txBody>
+            </p:sp>
+            <p:grpSp>
+              <p:nvGrpSpPr>
+                <p:cNvPr id="50" name="Group 49">
+                  <a:extLst>
+                    <a:ext uri="{FF2B5EF4-FFF2-40B4-BE49-F238E27FC236}">
+                      <a16:creationId xmlns:a16="http://schemas.microsoft.com/office/drawing/2014/main" id="{C73AE796-6455-43BC-967A-B5E16D7831D4}"/>
+                    </a:ext>
+                  </a:extLst>
+                </p:cNvPr>
+                <p:cNvGrpSpPr/>
+                <p:nvPr/>
+              </p:nvGrpSpPr>
+              <p:grpSpPr>
+                <a:xfrm>
+                  <a:off x="6150522" y="2299767"/>
+                  <a:ext cx="2159535" cy="2926983"/>
+                  <a:chOff x="4258439" y="2292005"/>
+                  <a:chExt cx="2159535" cy="2926983"/>
+                </a:xfrm>
+              </p:grpSpPr>
+              <p:sp>
+                <p:nvSpPr>
+                  <p:cNvPr id="46" name="Arrow: U-Turn 45">
+                    <a:extLst>
+                      <a:ext uri="{FF2B5EF4-FFF2-40B4-BE49-F238E27FC236}">
+                        <a16:creationId xmlns:a16="http://schemas.microsoft.com/office/drawing/2014/main" id="{DD82B258-948E-4F43-A1C6-29A1B78DE6AB}"/>
+                      </a:ext>
+                    </a:extLst>
+                  </p:cNvPr>
+                  <p:cNvSpPr/>
+                  <p:nvPr/>
+                </p:nvSpPr>
+                <p:spPr>
+                  <a:xfrm>
+                    <a:off x="5180891" y="2292005"/>
+                    <a:ext cx="1237083" cy="2926983"/>
+                  </a:xfrm>
+                  <a:prstGeom prst="uturnArrow">
+                    <a:avLst>
+                      <a:gd name="adj1" fmla="val 25000"/>
+                      <a:gd name="adj2" fmla="val 25000"/>
+                      <a:gd name="adj3" fmla="val 25616"/>
+                      <a:gd name="adj4" fmla="val 42247"/>
+                      <a:gd name="adj5" fmla="val 28422"/>
+                    </a:avLst>
+                  </a:prstGeom>
+                  <a:solidFill>
+                    <a:srgbClr val="0563C1"/>
+                  </a:solidFill>
+                  <a:ln>
+                    <a:noFill/>
+                  </a:ln>
+                </p:spPr>
+                <p:style>
+                  <a:lnRef idx="2">
+                    <a:schemeClr val="accent1">
+                      <a:shade val="50000"/>
+                    </a:schemeClr>
+                  </a:lnRef>
+                  <a:fillRef idx="1">
+                    <a:schemeClr val="accent1"/>
+                  </a:fillRef>
+                  <a:effectRef idx="0">
+                    <a:schemeClr val="accent1"/>
+                  </a:effectRef>
+                  <a:fontRef idx="minor">
+                    <a:schemeClr val="lt1"/>
+                  </a:fontRef>
+                </p:style>
+                <p:txBody>
+                  <a:bodyPr rtlCol="0" anchor="ctr"/>
+                  <a:lstStyle/>
+                  <a:p>
+                    <a:pPr algn="ctr"/>
+                    <a:endParaRPr lang="en-US">
+                      <a:solidFill>
+                        <a:schemeClr val="tx1"/>
+                      </a:solidFill>
+                    </a:endParaRPr>
+                  </a:p>
+                </p:txBody>
+              </p:sp>
+              <p:sp>
+                <p:nvSpPr>
+                  <p:cNvPr id="49" name="Arrow: U-Turn 48">
+                    <a:extLst>
+                      <a:ext uri="{FF2B5EF4-FFF2-40B4-BE49-F238E27FC236}">
+                        <a16:creationId xmlns:a16="http://schemas.microsoft.com/office/drawing/2014/main" id="{4F4BC159-53C5-4B81-96CA-482C0D0C003D}"/>
+                      </a:ext>
+                    </a:extLst>
+                  </p:cNvPr>
+                  <p:cNvSpPr/>
+                  <p:nvPr/>
+                </p:nvSpPr>
+                <p:spPr>
+                  <a:xfrm flipH="1">
+                    <a:off x="4258439" y="2292005"/>
+                    <a:ext cx="1234440" cy="2926983"/>
+                  </a:xfrm>
+                  <a:prstGeom prst="uturnArrow">
+                    <a:avLst>
+                      <a:gd name="adj1" fmla="val 25000"/>
+                      <a:gd name="adj2" fmla="val 25000"/>
+                      <a:gd name="adj3" fmla="val 25616"/>
+                      <a:gd name="adj4" fmla="val 42247"/>
+                      <a:gd name="adj5" fmla="val 28422"/>
+                    </a:avLst>
+                  </a:prstGeom>
+                  <a:solidFill>
+                    <a:srgbClr val="0563C1"/>
+                  </a:solidFill>
+                  <a:ln>
+                    <a:noFill/>
+                  </a:ln>
+                </p:spPr>
+                <p:style>
+                  <a:lnRef idx="2">
+                    <a:schemeClr val="accent1">
+                      <a:shade val="50000"/>
+                    </a:schemeClr>
+                  </a:lnRef>
+                  <a:fillRef idx="1">
+                    <a:schemeClr val="accent1"/>
+                  </a:fillRef>
+                  <a:effectRef idx="0">
+                    <a:schemeClr val="accent1"/>
+                  </a:effectRef>
+                  <a:fontRef idx="minor">
+                    <a:schemeClr val="lt1"/>
+                  </a:fontRef>
+                </p:style>
+                <p:txBody>
+                  <a:bodyPr rtlCol="0" anchor="ctr"/>
+                  <a:lstStyle/>
+                  <a:p>
+                    <a:pPr algn="ctr"/>
+                    <a:endParaRPr lang="en-US">
+                      <a:solidFill>
+                        <a:schemeClr val="tx1"/>
+                      </a:solidFill>
+                    </a:endParaRPr>
+                  </a:p>
+                </p:txBody>
+              </p:sp>
+              <p:sp>
+                <p:nvSpPr>
+                  <p:cNvPr id="30" name="Arrow: Up 29">
+                    <a:extLst>
+                      <a:ext uri="{FF2B5EF4-FFF2-40B4-BE49-F238E27FC236}">
+                        <a16:creationId xmlns:a16="http://schemas.microsoft.com/office/drawing/2014/main" id="{2D51BD65-5F71-4556-995C-2301D7549D5C}"/>
+                      </a:ext>
+                    </a:extLst>
+                  </p:cNvPr>
+                  <p:cNvSpPr/>
+                  <p:nvPr/>
+                </p:nvSpPr>
+                <p:spPr>
+                  <a:xfrm>
+                    <a:off x="5257003" y="3692113"/>
+                    <a:ext cx="189505" cy="1200682"/>
+                  </a:xfrm>
+                  <a:prstGeom prst="upArrow">
+                    <a:avLst/>
+                  </a:prstGeom>
+                </p:spPr>
+                <p:style>
+                  <a:lnRef idx="2">
+                    <a:schemeClr val="accent1">
+                      <a:shade val="50000"/>
+                    </a:schemeClr>
+                  </a:lnRef>
+                  <a:fillRef idx="1">
+                    <a:schemeClr val="accent1"/>
+                  </a:fillRef>
+                  <a:effectRef idx="0">
+                    <a:schemeClr val="accent1"/>
+                  </a:effectRef>
+                  <a:fontRef idx="minor">
+                    <a:schemeClr val="lt1"/>
+                  </a:fontRef>
+                </p:style>
+                <p:txBody>
+                  <a:bodyPr rtlCol="0" anchor="ctr"/>
+                  <a:lstStyle/>
+                  <a:p>
+                    <a:pPr algn="ctr"/>
+                    <a:endParaRPr lang="en-US"/>
+                  </a:p>
+                </p:txBody>
+              </p:sp>
+            </p:grpSp>
+          </p:grpSp>
           <p:sp>
             <p:nvSpPr>
-              <p:cNvPr id="7" name="Freeform 6">
+              <p:cNvPr id="33" name="Oval 32">
                 <a:extLst>
                   <a:ext uri="{FF2B5EF4-FFF2-40B4-BE49-F238E27FC236}">
-                    <a16:creationId xmlns:a16="http://schemas.microsoft.com/office/drawing/2014/main" id="{58021AEB-702F-4BE2-BE8C-D90490646ADA}"/>
-                  </a:ext>
-                </a:extLst>
-              </p:cNvPr>
-              <p:cNvSpPr>
-                <a:spLocks/>
-              </p:cNvSpPr>
-              <p:nvPr/>
-            </p:nvSpPr>
-            <p:spPr bwMode="auto">
-              <a:xfrm>
-                <a:off x="2146040" y="2304897"/>
-                <a:ext cx="1831457" cy="2948238"/>
-              </a:xfrm>
-              <a:custGeom>
-                <a:avLst/>
-                <a:gdLst/>
-                <a:ahLst/>
-                <a:cxnLst>
-                  <a:cxn ang="0">
-                    <a:pos x="0" y="0"/>
-                  </a:cxn>
-                  <a:cxn ang="0">
-                    <a:pos x="0" y="528"/>
-                  </a:cxn>
-                  <a:cxn ang="0">
-                    <a:pos x="3216" y="528"/>
-                  </a:cxn>
-                  <a:cxn ang="0">
-                    <a:pos x="3216" y="0"/>
-                  </a:cxn>
-                </a:cxnLst>
-                <a:rect l="0" t="0" r="r" b="b"/>
-                <a:pathLst>
-                  <a:path w="3216" h="528">
-                    <a:moveTo>
-                      <a:pt x="0" y="0"/>
-                    </a:moveTo>
-                    <a:lnTo>
-                      <a:pt x="0" y="528"/>
-                    </a:lnTo>
-                    <a:lnTo>
-                      <a:pt x="3216" y="528"/>
-                    </a:lnTo>
-                    <a:lnTo>
-                      <a:pt x="3216" y="0"/>
-                    </a:lnTo>
-                  </a:path>
-                </a:pathLst>
-              </a:custGeom>
-              <a:solidFill>
-                <a:schemeClr val="hlink"/>
-              </a:solidFill>
-              <a:ln w="57150" cap="flat" cmpd="sng">
-                <a:solidFill>
-                  <a:schemeClr val="tx1">
-                    <a:alpha val="78000"/>
-                  </a:schemeClr>
-                </a:solidFill>
-                <a:prstDash val="solid"/>
-                <a:round/>
-                <a:headEnd type="none" w="lg" len="med"/>
-                <a:tailEnd type="none" w="lg" len="med"/>
-              </a:ln>
-              <a:effectLst/>
-            </p:spPr>
-            <p:txBody>
-              <a:bodyPr wrap="square" anchor="ctr">
-                <a:spAutoFit/>
-              </a:bodyPr>
-              <a:lstStyle/>
-              <a:p>
-                <a:endParaRPr lang="en-US" dirty="0"/>
-              </a:p>
-            </p:txBody>
-          </p:sp>
-          <p:cxnSp>
-            <p:nvCxnSpPr>
-              <p:cNvPr id="19" name="Straight Connector 18">
-                <a:extLst>
-                  <a:ext uri="{FF2B5EF4-FFF2-40B4-BE49-F238E27FC236}">
-                    <a16:creationId xmlns:a16="http://schemas.microsoft.com/office/drawing/2014/main" id="{CD12D136-1B8D-4819-9342-DB7938625856}"/>
-                  </a:ext>
-                </a:extLst>
-              </p:cNvPr>
-              <p:cNvCxnSpPr/>
-              <p:nvPr/>
-            </p:nvCxnSpPr>
-            <p:spPr>
-              <a:xfrm>
-                <a:off x="4267057" y="2304897"/>
-                <a:ext cx="604663" cy="0"/>
-              </a:xfrm>
-              <a:prstGeom prst="line">
-                <a:avLst/>
-              </a:prstGeom>
-              <a:ln w="28575">
-                <a:solidFill>
-                  <a:srgbClr val="FF0000"/>
-                </a:solidFill>
-              </a:ln>
-            </p:spPr>
-            <p:style>
-              <a:lnRef idx="1">
-                <a:schemeClr val="accent1"/>
-              </a:lnRef>
-              <a:fillRef idx="0">
-                <a:schemeClr val="accent1"/>
-              </a:fillRef>
-              <a:effectRef idx="0">
-                <a:schemeClr val="accent1"/>
-              </a:effectRef>
-              <a:fontRef idx="minor">
-                <a:schemeClr val="tx1"/>
-              </a:fontRef>
-            </p:style>
-          </p:cxnSp>
-          <p:cxnSp>
-            <p:nvCxnSpPr>
-              <p:cNvPr id="20" name="Straight Connector 19">
-                <a:extLst>
-                  <a:ext uri="{FF2B5EF4-FFF2-40B4-BE49-F238E27FC236}">
-                    <a16:creationId xmlns:a16="http://schemas.microsoft.com/office/drawing/2014/main" id="{36825B29-9467-409D-960E-0015624CE2F1}"/>
-                  </a:ext>
-                </a:extLst>
-              </p:cNvPr>
-              <p:cNvCxnSpPr/>
-              <p:nvPr/>
-            </p:nvCxnSpPr>
-            <p:spPr>
-              <a:xfrm>
-                <a:off x="5184140" y="2304044"/>
-                <a:ext cx="604663" cy="0"/>
-              </a:xfrm>
-              <a:prstGeom prst="line">
-                <a:avLst/>
-              </a:prstGeom>
-              <a:ln w="28575">
-                <a:solidFill>
-                  <a:srgbClr val="FF0000"/>
-                </a:solidFill>
-              </a:ln>
-            </p:spPr>
-            <p:style>
-              <a:lnRef idx="1">
-                <a:schemeClr val="accent1"/>
-              </a:lnRef>
-              <a:fillRef idx="0">
-                <a:schemeClr val="accent1"/>
-              </a:fillRef>
-              <a:effectRef idx="0">
-                <a:schemeClr val="accent1"/>
-              </a:effectRef>
-              <a:fontRef idx="minor">
-                <a:schemeClr val="tx1"/>
-              </a:fontRef>
-            </p:style>
-          </p:cxnSp>
-          <p:cxnSp>
-            <p:nvCxnSpPr>
-              <p:cNvPr id="21" name="Straight Connector 20">
-                <a:extLst>
-                  <a:ext uri="{FF2B5EF4-FFF2-40B4-BE49-F238E27FC236}">
-                    <a16:creationId xmlns:a16="http://schemas.microsoft.com/office/drawing/2014/main" id="{9B3030BC-8E03-47F5-9DC2-0431DC1BFA87}"/>
-                  </a:ext>
-                </a:extLst>
-              </p:cNvPr>
-              <p:cNvCxnSpPr/>
-              <p:nvPr/>
-            </p:nvCxnSpPr>
-            <p:spPr>
-              <a:xfrm>
-                <a:off x="6101137" y="2304044"/>
-                <a:ext cx="604663" cy="0"/>
-              </a:xfrm>
-              <a:prstGeom prst="line">
-                <a:avLst/>
-              </a:prstGeom>
-              <a:ln w="28575">
-                <a:solidFill>
-                  <a:srgbClr val="FF0000"/>
-                </a:solidFill>
-              </a:ln>
-            </p:spPr>
-            <p:style>
-              <a:lnRef idx="1">
-                <a:schemeClr val="accent1"/>
-              </a:lnRef>
-              <a:fillRef idx="0">
-                <a:schemeClr val="accent1"/>
-              </a:fillRef>
-              <a:effectRef idx="0">
-                <a:schemeClr val="accent1"/>
-              </a:effectRef>
-              <a:fontRef idx="minor">
-                <a:schemeClr val="tx1"/>
-              </a:fontRef>
-            </p:style>
-          </p:cxnSp>
-          <p:cxnSp>
-            <p:nvCxnSpPr>
-              <p:cNvPr id="22" name="Straight Connector 21">
-                <a:extLst>
-                  <a:ext uri="{FF2B5EF4-FFF2-40B4-BE49-F238E27FC236}">
-                    <a16:creationId xmlns:a16="http://schemas.microsoft.com/office/drawing/2014/main" id="{C89E168E-ADBF-454F-BB89-8A628292715A}"/>
-                  </a:ext>
-                </a:extLst>
-              </p:cNvPr>
-              <p:cNvCxnSpPr/>
-              <p:nvPr/>
-            </p:nvCxnSpPr>
-            <p:spPr>
-              <a:xfrm>
-                <a:off x="7007917" y="2304044"/>
-                <a:ext cx="604663" cy="0"/>
-              </a:xfrm>
-              <a:prstGeom prst="line">
-                <a:avLst/>
-              </a:prstGeom>
-              <a:ln w="28575">
-                <a:solidFill>
-                  <a:srgbClr val="FF0000"/>
-                </a:solidFill>
-              </a:ln>
-            </p:spPr>
-            <p:style>
-              <a:lnRef idx="1">
-                <a:schemeClr val="accent1"/>
-              </a:lnRef>
-              <a:fillRef idx="0">
-                <a:schemeClr val="accent1"/>
-              </a:fillRef>
-              <a:effectRef idx="0">
-                <a:schemeClr val="accent1"/>
-              </a:effectRef>
-              <a:fontRef idx="minor">
-                <a:schemeClr val="tx1"/>
-              </a:fontRef>
-            </p:style>
-          </p:cxnSp>
-          <p:cxnSp>
-            <p:nvCxnSpPr>
-              <p:cNvPr id="23" name="Straight Connector 22">
-                <a:extLst>
-                  <a:ext uri="{FF2B5EF4-FFF2-40B4-BE49-F238E27FC236}">
-                    <a16:creationId xmlns:a16="http://schemas.microsoft.com/office/drawing/2014/main" id="{AC2E2D4A-8DD2-4B77-8B9A-848BFCE4D606}"/>
-                  </a:ext>
-                </a:extLst>
-              </p:cNvPr>
-              <p:cNvCxnSpPr/>
-              <p:nvPr/>
-            </p:nvCxnSpPr>
-            <p:spPr>
-              <a:xfrm>
-                <a:off x="7922317" y="2299228"/>
-                <a:ext cx="604663" cy="0"/>
-              </a:xfrm>
-              <a:prstGeom prst="line">
-                <a:avLst/>
-              </a:prstGeom>
-              <a:ln w="28575">
-                <a:solidFill>
-                  <a:srgbClr val="FF0000"/>
-                </a:solidFill>
-              </a:ln>
-            </p:spPr>
-            <p:style>
-              <a:lnRef idx="1">
-                <a:schemeClr val="accent1"/>
-              </a:lnRef>
-              <a:fillRef idx="0">
-                <a:schemeClr val="accent1"/>
-              </a:fillRef>
-              <a:effectRef idx="0">
-                <a:schemeClr val="accent1"/>
-              </a:effectRef>
-              <a:fontRef idx="minor">
-                <a:schemeClr val="tx1"/>
-              </a:fontRef>
-            </p:style>
-          </p:cxnSp>
-          <p:cxnSp>
-            <p:nvCxnSpPr>
-              <p:cNvPr id="24" name="Straight Connector 23">
-                <a:extLst>
-                  <a:ext uri="{FF2B5EF4-FFF2-40B4-BE49-F238E27FC236}">
-                    <a16:creationId xmlns:a16="http://schemas.microsoft.com/office/drawing/2014/main" id="{4C3BC8D4-DF42-46E8-BC95-659901EFA2C7}"/>
-                  </a:ext>
-                </a:extLst>
-              </p:cNvPr>
-              <p:cNvCxnSpPr/>
-              <p:nvPr/>
-            </p:nvCxnSpPr>
-            <p:spPr>
-              <a:xfrm>
-                <a:off x="3359712" y="2299228"/>
-                <a:ext cx="604663" cy="0"/>
-              </a:xfrm>
-              <a:prstGeom prst="line">
-                <a:avLst/>
-              </a:prstGeom>
-              <a:ln w="28575">
-                <a:solidFill>
-                  <a:srgbClr val="FF0000"/>
-                </a:solidFill>
-              </a:ln>
-            </p:spPr>
-            <p:style>
-              <a:lnRef idx="1">
-                <a:schemeClr val="accent1"/>
-              </a:lnRef>
-              <a:fillRef idx="0">
-                <a:schemeClr val="accent1"/>
-              </a:fillRef>
-              <a:effectRef idx="0">
-                <a:schemeClr val="accent1"/>
-              </a:effectRef>
-              <a:fontRef idx="minor">
-                <a:schemeClr val="tx1"/>
-              </a:fontRef>
-            </p:style>
-          </p:cxnSp>
-          <p:cxnSp>
-            <p:nvCxnSpPr>
-              <p:cNvPr id="25" name="Straight Connector 24">
-                <a:extLst>
-                  <a:ext uri="{FF2B5EF4-FFF2-40B4-BE49-F238E27FC236}">
-                    <a16:creationId xmlns:a16="http://schemas.microsoft.com/office/drawing/2014/main" id="{66D0DB74-2689-4A1E-9AA0-0E42392816FC}"/>
-                  </a:ext>
-                </a:extLst>
-              </p:cNvPr>
-              <p:cNvCxnSpPr/>
-              <p:nvPr/>
-            </p:nvCxnSpPr>
-            <p:spPr>
-              <a:xfrm>
-                <a:off x="2452932" y="2299228"/>
-                <a:ext cx="604663" cy="0"/>
-              </a:xfrm>
-              <a:prstGeom prst="line">
-                <a:avLst/>
-              </a:prstGeom>
-              <a:ln w="28575">
-                <a:solidFill>
-                  <a:srgbClr val="FF0000"/>
-                </a:solidFill>
-              </a:ln>
-            </p:spPr>
-            <p:style>
-              <a:lnRef idx="1">
-                <a:schemeClr val="accent1"/>
-              </a:lnRef>
-              <a:fillRef idx="0">
-                <a:schemeClr val="accent1"/>
-              </a:fillRef>
-              <a:effectRef idx="0">
-                <a:schemeClr val="accent1"/>
-              </a:effectRef>
-              <a:fontRef idx="minor">
-                <a:schemeClr val="tx1"/>
-              </a:fontRef>
-            </p:style>
-          </p:cxnSp>
-          <p:cxnSp>
-            <p:nvCxnSpPr>
-              <p:cNvPr id="26" name="Straight Connector 25">
-                <a:extLst>
-                  <a:ext uri="{FF2B5EF4-FFF2-40B4-BE49-F238E27FC236}">
-                    <a16:creationId xmlns:a16="http://schemas.microsoft.com/office/drawing/2014/main" id="{3EFCB8FE-B858-4B0A-8B35-B9432A3D6149}"/>
-                  </a:ext>
-                </a:extLst>
-              </p:cNvPr>
-              <p:cNvCxnSpPr/>
-              <p:nvPr/>
-            </p:nvCxnSpPr>
-            <p:spPr>
-              <a:xfrm>
-                <a:off x="1533757" y="2299228"/>
-                <a:ext cx="604663" cy="0"/>
-              </a:xfrm>
-              <a:prstGeom prst="line">
-                <a:avLst/>
-              </a:prstGeom>
-              <a:ln w="28575">
-                <a:solidFill>
-                  <a:srgbClr val="FF0000"/>
-                </a:solidFill>
-              </a:ln>
-            </p:spPr>
-            <p:style>
-              <a:lnRef idx="1">
-                <a:schemeClr val="accent1"/>
-              </a:lnRef>
-              <a:fillRef idx="0">
-                <a:schemeClr val="accent1"/>
-              </a:fillRef>
-              <a:effectRef idx="0">
-                <a:schemeClr val="accent1"/>
-              </a:effectRef>
-              <a:fontRef idx="minor">
-                <a:schemeClr val="tx1"/>
-              </a:fontRef>
-            </p:style>
-          </p:cxnSp>
-          <p:cxnSp>
-            <p:nvCxnSpPr>
-              <p:cNvPr id="29" name="Straight Arrow Connector 28">
-                <a:extLst>
-                  <a:ext uri="{FF2B5EF4-FFF2-40B4-BE49-F238E27FC236}">
-                    <a16:creationId xmlns:a16="http://schemas.microsoft.com/office/drawing/2014/main" id="{F722C922-5779-4187-A3E8-D78E77F764F0}"/>
-                  </a:ext>
-                </a:extLst>
-              </p:cNvPr>
-              <p:cNvCxnSpPr/>
-              <p:nvPr/>
-            </p:nvCxnSpPr>
-            <p:spPr>
-              <a:xfrm>
-                <a:off x="8526980" y="2299228"/>
-                <a:ext cx="0" cy="2949057"/>
-              </a:xfrm>
-              <a:prstGeom prst="straightConnector1">
-                <a:avLst/>
-              </a:prstGeom>
-              <a:ln w="19050">
-                <a:solidFill>
-                  <a:schemeClr val="tx1"/>
-                </a:solidFill>
-                <a:headEnd type="triangle" w="lg" len="lg"/>
-                <a:tailEnd type="triangle" w="lg" len="lg"/>
-              </a:ln>
-            </p:spPr>
-            <p:style>
-              <a:lnRef idx="1">
-                <a:schemeClr val="accent1"/>
-              </a:lnRef>
-              <a:fillRef idx="0">
-                <a:schemeClr val="accent1"/>
-              </a:fillRef>
-              <a:effectRef idx="0">
-                <a:schemeClr val="accent1"/>
-              </a:effectRef>
-              <a:fontRef idx="minor">
-                <a:schemeClr val="tx1"/>
-              </a:fontRef>
-            </p:style>
-          </p:cxnSp>
-          <p:sp>
-            <p:nvSpPr>
-              <p:cNvPr id="27" name="TextBox 26">
-                <a:extLst>
-                  <a:ext uri="{FF2B5EF4-FFF2-40B4-BE49-F238E27FC236}">
-                    <a16:creationId xmlns:a16="http://schemas.microsoft.com/office/drawing/2014/main" id="{A657B6E9-1301-4DD7-9ED5-5184F2D8624C}"/>
-                  </a:ext>
-                </a:extLst>
-              </p:cNvPr>
-              <p:cNvSpPr txBox="1"/>
-              <p:nvPr/>
-            </p:nvSpPr>
-            <p:spPr>
-              <a:xfrm>
-                <a:off x="8065411" y="3499923"/>
-                <a:ext cx="883575" cy="369332"/>
-              </a:xfrm>
-              <a:prstGeom prst="rect">
-                <a:avLst/>
-              </a:prstGeom>
-              <a:solidFill>
-                <a:schemeClr val="bg1"/>
-              </a:solidFill>
-            </p:spPr>
-            <p:txBody>
-              <a:bodyPr wrap="none" rtlCol="0">
-                <a:spAutoFit/>
-              </a:bodyPr>
-              <a:lstStyle/>
-              <a:p>
-                <a:r>
-                  <a:rPr lang="en-US" dirty="0">
-                    <a:latin typeface="Times New Roman" panose="02020603050405020304" pitchFamily="18" charset="0"/>
-                    <a:cs typeface="Times New Roman" panose="02020603050405020304" pitchFamily="18" charset="0"/>
-                  </a:rPr>
-                  <a:t>1 meter</a:t>
-                </a:r>
-              </a:p>
-            </p:txBody>
-          </p:sp>
-          <p:sp>
-            <p:nvSpPr>
-              <p:cNvPr id="35" name="Oval 34">
-                <a:extLst>
-                  <a:ext uri="{FF2B5EF4-FFF2-40B4-BE49-F238E27FC236}">
-                    <a16:creationId xmlns:a16="http://schemas.microsoft.com/office/drawing/2014/main" id="{EA246440-DD76-4A9D-8AB9-FE1F7B5B9DD6}"/>
+                    <a16:creationId xmlns:a16="http://schemas.microsoft.com/office/drawing/2014/main" id="{58E03121-E633-4C56-93E4-9DE553DA5A71}"/>
                   </a:ext>
                 </a:extLst>
               </p:cNvPr>
@@ -4065,7 +4740,7 @@
             </p:nvSpPr>
             <p:spPr bwMode="auto">
               <a:xfrm>
-                <a:off x="2982691" y="5129714"/>
+                <a:off x="6729393" y="2211671"/>
                 <a:ext cx="149807" cy="149807"/>
               </a:xfrm>
               <a:prstGeom prst="ellipse">
@@ -4126,10 +4801,10 @@
           </p:sp>
           <p:sp>
             <p:nvSpPr>
-              <p:cNvPr id="36" name="Oval 35">
+              <p:cNvPr id="34" name="Oval 33">
                 <a:extLst>
                   <a:ext uri="{FF2B5EF4-FFF2-40B4-BE49-F238E27FC236}">
-                    <a16:creationId xmlns:a16="http://schemas.microsoft.com/office/drawing/2014/main" id="{B636916F-E631-43D5-AFCF-FB0EFA6E981D}"/>
+                    <a16:creationId xmlns:a16="http://schemas.microsoft.com/office/drawing/2014/main" id="{994E1818-2EF6-4FBA-9794-BFFCF85AEFB5}"/>
                   </a:ext>
                 </a:extLst>
               </p:cNvPr>
@@ -4138,7 +4813,7 @@
             </p:nvSpPr>
             <p:spPr bwMode="auto">
               <a:xfrm>
-                <a:off x="2992569" y="2224324"/>
+                <a:off x="7553282" y="2198478"/>
                 <a:ext cx="149807" cy="149807"/>
               </a:xfrm>
               <a:prstGeom prst="ellipse">
@@ -4199,22 +4874,23 @@
           </p:sp>
           <p:cxnSp>
             <p:nvCxnSpPr>
-              <p:cNvPr id="38" name="Straight Connector 37">
+              <p:cNvPr id="3" name="Straight Connector 2">
                 <a:extLst>
                   <a:ext uri="{FF2B5EF4-FFF2-40B4-BE49-F238E27FC236}">
-                    <a16:creationId xmlns:a16="http://schemas.microsoft.com/office/drawing/2014/main" id="{A73CFDDE-A54D-4C47-93ED-C83A5CBFF56A}"/>
+                    <a16:creationId xmlns:a16="http://schemas.microsoft.com/office/drawing/2014/main" id="{BB464499-4CFC-4B40-A0EF-2756FECE2114}"/>
                   </a:ext>
                 </a:extLst>
               </p:cNvPr>
               <p:cNvCxnSpPr>
-                <a:stCxn id="35" idx="4"/>
+                <a:cxnSpLocks/>
+                <a:endCxn id="44" idx="1"/>
               </p:cNvCxnSpPr>
               <p:nvPr/>
             </p:nvCxnSpPr>
             <p:spPr>
-              <a:xfrm flipH="1">
-                <a:off x="3057594" y="5279521"/>
-                <a:ext cx="1" cy="184019"/>
+              <a:xfrm flipV="1">
+                <a:off x="3057675" y="1589466"/>
+                <a:ext cx="466172" cy="15398"/>
               </a:xfrm>
               <a:prstGeom prst="line">
                 <a:avLst/>
@@ -4235,592 +4911,51 @@
               </a:fontRef>
             </p:style>
           </p:cxnSp>
-          <p:grpSp>
-            <p:nvGrpSpPr>
-              <p:cNvPr id="12" name="Group 11">
+          <p:cxnSp>
+            <p:nvCxnSpPr>
+              <p:cNvPr id="45" name="Straight Connector 44">
                 <a:extLst>
                   <a:ext uri="{FF2B5EF4-FFF2-40B4-BE49-F238E27FC236}">
-                    <a16:creationId xmlns:a16="http://schemas.microsoft.com/office/drawing/2014/main" id="{AA99E7F0-9391-4D18-ADB3-3BE01FBAD3B1}"/>
+                    <a16:creationId xmlns:a16="http://schemas.microsoft.com/office/drawing/2014/main" id="{FC382F06-1410-47AC-8FC6-444E1A4A6FB0}"/>
                   </a:ext>
                 </a:extLst>
               </p:cNvPr>
-              <p:cNvGrpSpPr/>
+              <p:cNvCxnSpPr>
+                <a:cxnSpLocks/>
+              </p:cNvCxnSpPr>
               <p:nvPr/>
-            </p:nvGrpSpPr>
-            <p:grpSpPr>
-              <a:xfrm>
-                <a:off x="3183114" y="2045186"/>
-                <a:ext cx="595784" cy="519420"/>
-                <a:chOff x="6545089" y="2384266"/>
-                <a:chExt cx="210233" cy="193882"/>
-              </a:xfrm>
-            </p:grpSpPr>
-            <p:sp>
-              <p:nvSpPr>
-                <p:cNvPr id="8" name="AutoShape 174">
-                  <a:extLst>
-                    <a:ext uri="{FF2B5EF4-FFF2-40B4-BE49-F238E27FC236}">
-                      <a16:creationId xmlns:a16="http://schemas.microsoft.com/office/drawing/2014/main" id="{826416CD-FFFE-46F3-BF71-6458DB2A561D}"/>
-                    </a:ext>
-                  </a:extLst>
-                </p:cNvPr>
-                <p:cNvSpPr>
-                  <a:spLocks noChangeArrowheads="1"/>
-                </p:cNvSpPr>
-                <p:nvPr/>
-              </p:nvSpPr>
-              <p:spPr bwMode="auto">
-                <a:xfrm flipV="1">
-                  <a:off x="6571368" y="2384266"/>
-                  <a:ext cx="157675" cy="105156"/>
-                </a:xfrm>
-                <a:prstGeom prst="triangle">
-                  <a:avLst>
-                    <a:gd name="adj" fmla="val 50000"/>
-                  </a:avLst>
-                </a:prstGeom>
-                <a:noFill/>
-                <a:ln w="12700">
-                  <a:solidFill>
-                    <a:schemeClr val="tx1"/>
-                  </a:solidFill>
-                  <a:miter lim="800000"/>
-                  <a:headEnd type="none" w="lg" len="med"/>
-                  <a:tailEnd type="none" w="lg" len="med"/>
-                </a:ln>
-                <a:effectLst/>
-              </p:spPr>
-              <p:txBody>
-                <a:bodyPr anchor="ctr">
-                  <a:spAutoFit/>
-                </a:bodyPr>
-                <a:lstStyle/>
-                <a:p>
-                  <a:endParaRPr lang="en-US"/>
-                </a:p>
-              </p:txBody>
-            </p:sp>
-            <p:sp>
-              <p:nvSpPr>
-                <p:cNvPr id="9" name="Line 175">
-                  <a:extLst>
-                    <a:ext uri="{FF2B5EF4-FFF2-40B4-BE49-F238E27FC236}">
-                      <a16:creationId xmlns:a16="http://schemas.microsoft.com/office/drawing/2014/main" id="{69E53567-22C4-4D37-B119-33F14895647C}"/>
-                    </a:ext>
-                  </a:extLst>
-                </p:cNvPr>
-                <p:cNvSpPr>
-                  <a:spLocks noChangeShapeType="1"/>
-                </p:cNvSpPr>
-                <p:nvPr/>
-              </p:nvSpPr>
-              <p:spPr bwMode="auto">
-                <a:xfrm>
-                  <a:off x="6545089" y="2518997"/>
-                  <a:ext cx="210233" cy="0"/>
-                </a:xfrm>
-                <a:prstGeom prst="line">
-                  <a:avLst/>
-                </a:prstGeom>
-                <a:noFill/>
-                <a:ln w="12700">
-                  <a:solidFill>
-                    <a:schemeClr val="tx1"/>
-                  </a:solidFill>
-                  <a:round/>
-                  <a:headEnd type="none" w="lg" len="med"/>
-                  <a:tailEnd type="none" w="lg" len="med"/>
-                </a:ln>
-                <a:effectLst/>
-              </p:spPr>
-              <p:txBody>
-                <a:bodyPr anchor="ctr">
-                  <a:spAutoFit/>
-                </a:bodyPr>
-                <a:lstStyle/>
-                <a:p>
-                  <a:endParaRPr lang="en-US"/>
-                </a:p>
-              </p:txBody>
-            </p:sp>
-            <p:sp>
-              <p:nvSpPr>
-                <p:cNvPr id="10" name="Line 176">
-                  <a:extLst>
-                    <a:ext uri="{FF2B5EF4-FFF2-40B4-BE49-F238E27FC236}">
-                      <a16:creationId xmlns:a16="http://schemas.microsoft.com/office/drawing/2014/main" id="{514E9AFB-CF9B-49C4-A21C-6AB30C91B677}"/>
-                    </a:ext>
-                  </a:extLst>
-                </p:cNvPr>
-                <p:cNvSpPr>
-                  <a:spLocks noChangeShapeType="1"/>
-                </p:cNvSpPr>
-                <p:nvPr/>
-              </p:nvSpPr>
-              <p:spPr bwMode="auto">
-                <a:xfrm>
-                  <a:off x="6571368" y="2548573"/>
-                  <a:ext cx="157675" cy="0"/>
-                </a:xfrm>
-                <a:prstGeom prst="line">
-                  <a:avLst/>
-                </a:prstGeom>
-                <a:noFill/>
-                <a:ln w="12700">
-                  <a:solidFill>
-                    <a:schemeClr val="tx1"/>
-                  </a:solidFill>
-                  <a:round/>
-                  <a:headEnd type="none" w="lg" len="med"/>
-                  <a:tailEnd type="none" w="lg" len="med"/>
-                </a:ln>
-                <a:effectLst/>
-              </p:spPr>
-              <p:txBody>
-                <a:bodyPr anchor="ctr">
-                  <a:spAutoFit/>
-                </a:bodyPr>
-                <a:lstStyle/>
-                <a:p>
-                  <a:endParaRPr lang="en-US"/>
-                </a:p>
-              </p:txBody>
-            </p:sp>
-            <p:sp>
-              <p:nvSpPr>
-                <p:cNvPr id="11" name="Line 177">
-                  <a:extLst>
-                    <a:ext uri="{FF2B5EF4-FFF2-40B4-BE49-F238E27FC236}">
-                      <a16:creationId xmlns:a16="http://schemas.microsoft.com/office/drawing/2014/main" id="{D3338B02-509F-4D1D-AFAE-EDDBF99A0DD1}"/>
-                    </a:ext>
-                  </a:extLst>
-                </p:cNvPr>
-                <p:cNvSpPr>
-                  <a:spLocks noChangeShapeType="1"/>
-                </p:cNvSpPr>
-                <p:nvPr/>
-              </p:nvSpPr>
-              <p:spPr bwMode="auto">
-                <a:xfrm>
-                  <a:off x="6602027" y="2578148"/>
-                  <a:ext cx="95262" cy="0"/>
-                </a:xfrm>
-                <a:prstGeom prst="line">
-                  <a:avLst/>
-                </a:prstGeom>
-                <a:noFill/>
-                <a:ln w="12700">
-                  <a:solidFill>
-                    <a:schemeClr val="tx1"/>
-                  </a:solidFill>
-                  <a:round/>
-                  <a:headEnd type="none" w="lg" len="med"/>
-                  <a:tailEnd type="none" w="lg" len="med"/>
-                </a:ln>
-                <a:effectLst/>
-              </p:spPr>
-              <p:txBody>
-                <a:bodyPr anchor="ctr">
-                  <a:spAutoFit/>
-                </a:bodyPr>
-                <a:lstStyle/>
-                <a:p>
-                  <a:endParaRPr lang="en-US"/>
-                </a:p>
-              </p:txBody>
-            </p:sp>
-          </p:grpSp>
-          <p:sp>
-            <p:nvSpPr>
-              <p:cNvPr id="42" name="TextBox 41">
-                <a:extLst>
-                  <a:ext uri="{FF2B5EF4-FFF2-40B4-BE49-F238E27FC236}">
-                    <a16:creationId xmlns:a16="http://schemas.microsoft.com/office/drawing/2014/main" id="{BA92C151-C849-4CCB-BFD0-5973E5E417DE}"/>
-                  </a:ext>
-                </a:extLst>
-              </p:cNvPr>
-              <p:cNvSpPr txBox="1"/>
-              <p:nvPr/>
-            </p:nvSpPr>
+            </p:nvCxnSpPr>
             <p:spPr>
               <a:xfrm>
-                <a:off x="6029404" y="5410700"/>
-                <a:ext cx="2428870" cy="369332"/>
+                <a:off x="6638249" y="1598642"/>
+                <a:ext cx="989936" cy="0"/>
               </a:xfrm>
-              <a:prstGeom prst="rect">
+              <a:prstGeom prst="line">
                 <a:avLst/>
               </a:prstGeom>
-              <a:solidFill>
-                <a:schemeClr val="bg1"/>
-              </a:solidFill>
             </p:spPr>
-            <p:txBody>
-              <a:bodyPr wrap="none" rtlCol="0">
-                <a:spAutoFit/>
-              </a:bodyPr>
-              <a:lstStyle/>
-              <a:p>
-                <a:r>
-                  <a:rPr lang="en-US" dirty="0">
-                    <a:latin typeface="Times New Roman" panose="02020603050405020304" pitchFamily="18" charset="0"/>
-                    <a:cs typeface="Times New Roman" panose="02020603050405020304" pitchFamily="18" charset="0"/>
-                  </a:rPr>
-                  <a:t>1 meter of velocity head</a:t>
-                </a:r>
-              </a:p>
-            </p:txBody>
-          </p:sp>
-          <p:sp>
-            <p:nvSpPr>
-              <p:cNvPr id="43" name="TextBox 42">
-                <a:extLst>
-                  <a:ext uri="{FF2B5EF4-FFF2-40B4-BE49-F238E27FC236}">
-                    <a16:creationId xmlns:a16="http://schemas.microsoft.com/office/drawing/2014/main" id="{F8B4DFB6-15DB-4E5B-B514-1CFBDF2ED0EA}"/>
-                  </a:ext>
-                </a:extLst>
-              </p:cNvPr>
-              <p:cNvSpPr txBox="1"/>
-              <p:nvPr/>
-            </p:nvSpPr>
-            <p:spPr>
-              <a:xfrm>
-                <a:off x="1838187" y="5463540"/>
-                <a:ext cx="2454518" cy="369332"/>
-              </a:xfrm>
-              <a:prstGeom prst="rect">
-                <a:avLst/>
-              </a:prstGeom>
-              <a:solidFill>
-                <a:schemeClr val="bg1"/>
-              </a:solidFill>
-            </p:spPr>
-            <p:txBody>
-              <a:bodyPr wrap="none" rtlCol="0">
-                <a:spAutoFit/>
-              </a:bodyPr>
-              <a:lstStyle/>
-              <a:p>
-                <a:r>
-                  <a:rPr lang="en-US" dirty="0">
-                    <a:latin typeface="Times New Roman" panose="02020603050405020304" pitchFamily="18" charset="0"/>
-                    <a:cs typeface="Times New Roman" panose="02020603050405020304" pitchFamily="18" charset="0"/>
-                  </a:rPr>
-                  <a:t>1 meter of pressure head</a:t>
-                </a:r>
-              </a:p>
-            </p:txBody>
-          </p:sp>
-          <p:sp>
-            <p:nvSpPr>
-              <p:cNvPr id="44" name="TextBox 43">
-                <a:extLst>
-                  <a:ext uri="{FF2B5EF4-FFF2-40B4-BE49-F238E27FC236}">
-                    <a16:creationId xmlns:a16="http://schemas.microsoft.com/office/drawing/2014/main" id="{543BB2FE-D7D0-402C-948C-BAF371D9E1B7}"/>
-                  </a:ext>
-                </a:extLst>
-              </p:cNvPr>
-              <p:cNvSpPr txBox="1"/>
-              <p:nvPr/>
-            </p:nvSpPr>
-            <p:spPr>
-              <a:xfrm>
-                <a:off x="3790130" y="1394668"/>
-                <a:ext cx="2531462" cy="369332"/>
-              </a:xfrm>
-              <a:prstGeom prst="rect">
-                <a:avLst/>
-              </a:prstGeom>
-              <a:solidFill>
-                <a:schemeClr val="bg1"/>
-              </a:solidFill>
-            </p:spPr>
-            <p:txBody>
-              <a:bodyPr wrap="none" rtlCol="0">
-                <a:spAutoFit/>
-              </a:bodyPr>
-              <a:lstStyle/>
-              <a:p>
-                <a:r>
-                  <a:rPr lang="en-US" dirty="0">
-                    <a:latin typeface="Times New Roman" panose="02020603050405020304" pitchFamily="18" charset="0"/>
-                    <a:cs typeface="Times New Roman" panose="02020603050405020304" pitchFamily="18" charset="0"/>
-                  </a:rPr>
-                  <a:t>1 meter of elevation head</a:t>
-                </a:r>
-              </a:p>
-            </p:txBody>
-          </p:sp>
-          <p:grpSp>
-            <p:nvGrpSpPr>
-              <p:cNvPr id="50" name="Group 49">
-                <a:extLst>
-                  <a:ext uri="{FF2B5EF4-FFF2-40B4-BE49-F238E27FC236}">
-                    <a16:creationId xmlns:a16="http://schemas.microsoft.com/office/drawing/2014/main" id="{C73AE796-6455-43BC-967A-B5E16D7831D4}"/>
-                  </a:ext>
-                </a:extLst>
-              </p:cNvPr>
-              <p:cNvGrpSpPr/>
-              <p:nvPr/>
-            </p:nvGrpSpPr>
-            <p:grpSpPr>
-              <a:xfrm>
-                <a:off x="6150522" y="2299767"/>
-                <a:ext cx="2159535" cy="2926983"/>
-                <a:chOff x="4258439" y="2292005"/>
-                <a:chExt cx="2159535" cy="2926983"/>
-              </a:xfrm>
-            </p:grpSpPr>
-            <p:sp>
-              <p:nvSpPr>
-                <p:cNvPr id="46" name="Arrow: U-Turn 45">
-                  <a:extLst>
-                    <a:ext uri="{FF2B5EF4-FFF2-40B4-BE49-F238E27FC236}">
-                      <a16:creationId xmlns:a16="http://schemas.microsoft.com/office/drawing/2014/main" id="{DD82B258-948E-4F43-A1C6-29A1B78DE6AB}"/>
-                    </a:ext>
-                  </a:extLst>
-                </p:cNvPr>
-                <p:cNvSpPr/>
-                <p:nvPr/>
-              </p:nvSpPr>
-              <p:spPr>
-                <a:xfrm>
-                  <a:off x="5180891" y="2292005"/>
-                  <a:ext cx="1237083" cy="2926983"/>
-                </a:xfrm>
-                <a:prstGeom prst="uturnArrow">
-                  <a:avLst>
-                    <a:gd name="adj1" fmla="val 25000"/>
-                    <a:gd name="adj2" fmla="val 25000"/>
-                    <a:gd name="adj3" fmla="val 25616"/>
-                    <a:gd name="adj4" fmla="val 42247"/>
-                    <a:gd name="adj5" fmla="val 28422"/>
-                  </a:avLst>
-                </a:prstGeom>
-                <a:solidFill>
-                  <a:srgbClr val="0563C1"/>
-                </a:solidFill>
-                <a:ln>
-                  <a:noFill/>
-                </a:ln>
-              </p:spPr>
-              <p:style>
-                <a:lnRef idx="2">
-                  <a:schemeClr val="accent1">
-                    <a:shade val="50000"/>
-                  </a:schemeClr>
-                </a:lnRef>
-                <a:fillRef idx="1">
-                  <a:schemeClr val="accent1"/>
-                </a:fillRef>
-                <a:effectRef idx="0">
-                  <a:schemeClr val="accent1"/>
-                </a:effectRef>
-                <a:fontRef idx="minor">
-                  <a:schemeClr val="lt1"/>
-                </a:fontRef>
-              </p:style>
-              <p:txBody>
-                <a:bodyPr rtlCol="0" anchor="ctr"/>
-                <a:lstStyle/>
-                <a:p>
-                  <a:pPr algn="ctr"/>
-                  <a:endParaRPr lang="en-US">
-                    <a:solidFill>
-                      <a:schemeClr val="tx1"/>
-                    </a:solidFill>
-                  </a:endParaRPr>
-                </a:p>
-              </p:txBody>
-            </p:sp>
-            <p:sp>
-              <p:nvSpPr>
-                <p:cNvPr id="49" name="Arrow: U-Turn 48">
-                  <a:extLst>
-                    <a:ext uri="{FF2B5EF4-FFF2-40B4-BE49-F238E27FC236}">
-                      <a16:creationId xmlns:a16="http://schemas.microsoft.com/office/drawing/2014/main" id="{4F4BC159-53C5-4B81-96CA-482C0D0C003D}"/>
-                    </a:ext>
-                  </a:extLst>
-                </p:cNvPr>
-                <p:cNvSpPr/>
-                <p:nvPr/>
-              </p:nvSpPr>
-              <p:spPr>
-                <a:xfrm flipH="1">
-                  <a:off x="4258439" y="2292005"/>
-                  <a:ext cx="1234440" cy="2926983"/>
-                </a:xfrm>
-                <a:prstGeom prst="uturnArrow">
-                  <a:avLst>
-                    <a:gd name="adj1" fmla="val 25000"/>
-                    <a:gd name="adj2" fmla="val 25000"/>
-                    <a:gd name="adj3" fmla="val 25616"/>
-                    <a:gd name="adj4" fmla="val 42247"/>
-                    <a:gd name="adj5" fmla="val 28422"/>
-                  </a:avLst>
-                </a:prstGeom>
-                <a:solidFill>
-                  <a:srgbClr val="0563C1"/>
-                </a:solidFill>
-                <a:ln>
-                  <a:noFill/>
-                </a:ln>
-              </p:spPr>
-              <p:style>
-                <a:lnRef idx="2">
-                  <a:schemeClr val="accent1">
-                    <a:shade val="50000"/>
-                  </a:schemeClr>
-                </a:lnRef>
-                <a:fillRef idx="1">
-                  <a:schemeClr val="accent1"/>
-                </a:fillRef>
-                <a:effectRef idx="0">
-                  <a:schemeClr val="accent1"/>
-                </a:effectRef>
-                <a:fontRef idx="minor">
-                  <a:schemeClr val="lt1"/>
-                </a:fontRef>
-              </p:style>
-              <p:txBody>
-                <a:bodyPr rtlCol="0" anchor="ctr"/>
-                <a:lstStyle/>
-                <a:p>
-                  <a:pPr algn="ctr"/>
-                  <a:endParaRPr lang="en-US">
-                    <a:solidFill>
-                      <a:schemeClr val="tx1"/>
-                    </a:solidFill>
-                  </a:endParaRPr>
-                </a:p>
-              </p:txBody>
-            </p:sp>
-            <p:sp>
-              <p:nvSpPr>
-                <p:cNvPr id="30" name="Arrow: Up 29">
-                  <a:extLst>
-                    <a:ext uri="{FF2B5EF4-FFF2-40B4-BE49-F238E27FC236}">
-                      <a16:creationId xmlns:a16="http://schemas.microsoft.com/office/drawing/2014/main" id="{2D51BD65-5F71-4556-995C-2301D7549D5C}"/>
-                    </a:ext>
-                  </a:extLst>
-                </p:cNvPr>
-                <p:cNvSpPr/>
-                <p:nvPr/>
-              </p:nvSpPr>
-              <p:spPr>
-                <a:xfrm>
-                  <a:off x="5257003" y="3692113"/>
-                  <a:ext cx="189505" cy="1200682"/>
-                </a:xfrm>
-                <a:prstGeom prst="upArrow">
-                  <a:avLst/>
-                </a:prstGeom>
-              </p:spPr>
-              <p:style>
-                <a:lnRef idx="2">
-                  <a:schemeClr val="accent1">
-                    <a:shade val="50000"/>
-                  </a:schemeClr>
-                </a:lnRef>
-                <a:fillRef idx="1">
-                  <a:schemeClr val="accent1"/>
-                </a:fillRef>
-                <a:effectRef idx="0">
-                  <a:schemeClr val="accent1"/>
-                </a:effectRef>
-                <a:fontRef idx="minor">
-                  <a:schemeClr val="lt1"/>
-                </a:fontRef>
-              </p:style>
-              <p:txBody>
-                <a:bodyPr rtlCol="0" anchor="ctr"/>
-                <a:lstStyle/>
-                <a:p>
-                  <a:pPr algn="ctr"/>
-                  <a:endParaRPr lang="en-US"/>
-                </a:p>
-              </p:txBody>
-            </p:sp>
-          </p:grpSp>
-          <p:sp>
-            <p:nvSpPr>
-              <p:cNvPr id="31" name="Oval 30">
-                <a:extLst>
-                  <a:ext uri="{FF2B5EF4-FFF2-40B4-BE49-F238E27FC236}">
-                    <a16:creationId xmlns:a16="http://schemas.microsoft.com/office/drawing/2014/main" id="{0F52903D-F9ED-469E-AACD-14BD4B407D76}"/>
-                  </a:ext>
-                </a:extLst>
-              </p:cNvPr>
-              <p:cNvSpPr/>
-              <p:nvPr/>
-            </p:nvSpPr>
-            <p:spPr bwMode="auto">
-              <a:xfrm>
-                <a:off x="7169446" y="5137472"/>
-                <a:ext cx="149807" cy="149807"/>
-              </a:xfrm>
-              <a:prstGeom prst="ellipse">
-                <a:avLst/>
-              </a:prstGeom>
-              <a:solidFill>
-                <a:srgbClr val="C00000"/>
-              </a:solidFill>
-              <a:ln w="12700" cap="flat" cmpd="sng" algn="ctr">
-                <a:solidFill>
-                  <a:srgbClr val="C00000"/>
-                </a:solidFill>
-                <a:prstDash val="solid"/>
-                <a:round/>
-                <a:headEnd type="none" w="lg" len="med"/>
-                <a:tailEnd type="none" w="lg" len="med"/>
-              </a:ln>
-              <a:effectLst/>
-            </p:spPr>
-            <p:txBody>
-              <a:bodyPr vert="horz" wrap="square" lIns="91440" tIns="45720" rIns="91440" bIns="45720" numCol="1" rtlCol="0" anchor="ctr" anchorCtr="0" compatLnSpc="1">
-                <a:prstTxWarp prst="textNoShape">
-                  <a:avLst/>
-                </a:prstTxWarp>
-                <a:spAutoFit/>
-              </a:bodyPr>
-              <a:lstStyle/>
-              <a:p>
-                <a:pPr marL="0" marR="0" indent="0" algn="l" defTabSz="914400" rtl="0" eaLnBrk="1" fontAlgn="base" latinLnBrk="0" hangingPunct="1">
-                  <a:lnSpc>
-                    <a:spcPct val="100000"/>
-                  </a:lnSpc>
-                  <a:spcBef>
-                    <a:spcPct val="0"/>
-                  </a:spcBef>
-                  <a:spcAft>
-                    <a:spcPct val="0"/>
-                  </a:spcAft>
-                  <a:buClrTx/>
-                  <a:buSzTx/>
-                  <a:buFontTx/>
-                  <a:buNone/>
-                  <a:tabLst/>
-                </a:pPr>
-                <a:endParaRPr kumimoji="0" lang="en-US" sz="1800" b="0" i="0" u="none" strike="noStrike" cap="none" normalizeH="0" baseline="0">
-                  <a:ln>
-                    <a:noFill/>
-                  </a:ln>
-                  <a:solidFill>
-                    <a:schemeClr val="tx1"/>
-                  </a:solidFill>
-                  <a:effectLst/>
-                  <a:latin typeface="Century Gothic" pitchFamily="34" charset="0"/>
-                  <a:cs typeface="Arial" charset="0"/>
-                </a:endParaRPr>
-              </a:p>
-            </p:txBody>
-          </p:sp>
+            <p:style>
+              <a:lnRef idx="1">
+                <a:schemeClr val="dk1"/>
+              </a:lnRef>
+              <a:fillRef idx="0">
+                <a:schemeClr val="dk1"/>
+              </a:fillRef>
+              <a:effectRef idx="0">
+                <a:schemeClr val="dk1"/>
+              </a:effectRef>
+              <a:fontRef idx="minor">
+                <a:schemeClr val="tx1"/>
+              </a:fontRef>
+            </p:style>
+          </p:cxnSp>
         </p:grpSp>
         <p:sp>
           <p:nvSpPr>
-            <p:cNvPr id="33" name="Oval 32">
+            <p:cNvPr id="47" name="Oval 46">
               <a:extLst>
                 <a:ext uri="{FF2B5EF4-FFF2-40B4-BE49-F238E27FC236}">
-                  <a16:creationId xmlns:a16="http://schemas.microsoft.com/office/drawing/2014/main" id="{58E03121-E633-4C56-93E4-9DE553DA5A71}"/>
+                  <a16:creationId xmlns:a16="http://schemas.microsoft.com/office/drawing/2014/main" id="{296D39F2-BE75-4427-8417-1AFBEE64EBCE}"/>
                 </a:ext>
               </a:extLst>
             </p:cNvPr>
@@ -4829,81 +4964,8 @@
           </p:nvSpPr>
           <p:spPr bwMode="auto">
             <a:xfrm>
-              <a:off x="6729393" y="2211671"/>
-              <a:ext cx="149807" cy="149807"/>
-            </a:xfrm>
-            <a:prstGeom prst="ellipse">
-              <a:avLst/>
-            </a:prstGeom>
-            <a:solidFill>
-              <a:srgbClr val="C00000"/>
-            </a:solidFill>
-            <a:ln w="12700" cap="flat" cmpd="sng" algn="ctr">
-              <a:solidFill>
-                <a:srgbClr val="C00000"/>
-              </a:solidFill>
-              <a:prstDash val="solid"/>
-              <a:round/>
-              <a:headEnd type="none" w="lg" len="med"/>
-              <a:tailEnd type="none" w="lg" len="med"/>
-            </a:ln>
-            <a:effectLst/>
-          </p:spPr>
-          <p:txBody>
-            <a:bodyPr vert="horz" wrap="square" lIns="91440" tIns="45720" rIns="91440" bIns="45720" numCol="1" rtlCol="0" anchor="ctr" anchorCtr="0" compatLnSpc="1">
-              <a:prstTxWarp prst="textNoShape">
-                <a:avLst/>
-              </a:prstTxWarp>
-              <a:spAutoFit/>
-            </a:bodyPr>
-            <a:lstStyle/>
-            <a:p>
-              <a:pPr marL="0" marR="0" indent="0" algn="l" defTabSz="914400" rtl="0" eaLnBrk="1" fontAlgn="base" latinLnBrk="0" hangingPunct="1">
-                <a:lnSpc>
-                  <a:spcPct val="100000"/>
-                </a:lnSpc>
-                <a:spcBef>
-                  <a:spcPct val="0"/>
-                </a:spcBef>
-                <a:spcAft>
-                  <a:spcPct val="0"/>
-                </a:spcAft>
-                <a:buClrTx/>
-                <a:buSzTx/>
-                <a:buFontTx/>
-                <a:buNone/>
-                <a:tabLst/>
-              </a:pPr>
-              <a:endParaRPr kumimoji="0" lang="en-US" sz="1800" b="0" i="0" u="none" strike="noStrike" cap="none" normalizeH="0" baseline="0">
-                <a:ln>
-                  <a:noFill/>
-                </a:ln>
-                <a:solidFill>
-                  <a:schemeClr val="tx1"/>
-                </a:solidFill>
-                <a:effectLst/>
-                <a:latin typeface="Century Gothic" pitchFamily="34" charset="0"/>
-                <a:cs typeface="Arial" charset="0"/>
-              </a:endParaRPr>
-            </a:p>
-          </p:txBody>
-        </p:sp>
-        <p:sp>
-          <p:nvSpPr>
-            <p:cNvPr id="34" name="Oval 33">
-              <a:extLst>
-                <a:ext uri="{FF2B5EF4-FFF2-40B4-BE49-F238E27FC236}">
-                  <a16:creationId xmlns:a16="http://schemas.microsoft.com/office/drawing/2014/main" id="{994E1818-2EF6-4FBA-9794-BFFCF85AEFB5}"/>
-                </a:ext>
-              </a:extLst>
-            </p:cNvPr>
-            <p:cNvSpPr/>
-            <p:nvPr/>
-          </p:nvSpPr>
-          <p:spPr bwMode="auto">
-            <a:xfrm>
-              <a:off x="7553282" y="2198478"/>
-              <a:ext cx="149807" cy="149807"/>
+              <a:off x="7136347" y="5170408"/>
+              <a:ext cx="141137" cy="141137"/>
             </a:xfrm>
             <a:prstGeom prst="ellipse">
               <a:avLst/>
@@ -4963,22 +5025,22 @@
         </p:sp>
         <p:cxnSp>
           <p:nvCxnSpPr>
-            <p:cNvPr id="3" name="Straight Connector 2">
+            <p:cNvPr id="48" name="Straight Connector 47">
               <a:extLst>
                 <a:ext uri="{FF2B5EF4-FFF2-40B4-BE49-F238E27FC236}">
-                  <a16:creationId xmlns:a16="http://schemas.microsoft.com/office/drawing/2014/main" id="{BB464499-4CFC-4B40-A0EF-2756FECE2114}"/>
+                  <a16:creationId xmlns:a16="http://schemas.microsoft.com/office/drawing/2014/main" id="{BC854EB2-CE05-4BEC-B7FF-353200332BE1}"/>
                 </a:ext>
               </a:extLst>
             </p:cNvPr>
             <p:cNvCxnSpPr>
-              <a:cxnSpLocks/>
+              <a:stCxn id="47" idx="4"/>
             </p:cNvCxnSpPr>
             <p:nvPr/>
           </p:nvCxnSpPr>
           <p:spPr>
-            <a:xfrm>
-              <a:off x="3057675" y="1604864"/>
-              <a:ext cx="646751" cy="0"/>
+            <a:xfrm flipH="1">
+              <a:off x="7206915" y="5311545"/>
+              <a:ext cx="1" cy="173369"/>
             </a:xfrm>
             <a:prstGeom prst="line">
               <a:avLst/>
@@ -4999,12 +5061,53 @@
             </a:fontRef>
           </p:style>
         </p:cxnSp>
+        <p:sp>
+          <p:nvSpPr>
+            <p:cNvPr id="51" name="TextBox 50">
+              <a:extLst>
+                <a:ext uri="{FF2B5EF4-FFF2-40B4-BE49-F238E27FC236}">
+                  <a16:creationId xmlns:a16="http://schemas.microsoft.com/office/drawing/2014/main" id="{82D1D3C3-CA4E-488C-AC4F-A86359E4E7F2}"/>
+                </a:ext>
+              </a:extLst>
+            </p:cNvPr>
+            <p:cNvSpPr txBox="1"/>
+            <p:nvPr/>
+          </p:nvSpPr>
+          <p:spPr>
+            <a:xfrm>
+              <a:off x="9322370" y="4917810"/>
+              <a:ext cx="1493069" cy="752253"/>
+            </a:xfrm>
+            <a:prstGeom prst="rect">
+              <a:avLst/>
+            </a:prstGeom>
+            <a:solidFill>
+              <a:schemeClr val="bg1"/>
+            </a:solidFill>
+          </p:spPr>
+          <p:txBody>
+            <a:bodyPr wrap="square" rtlCol="0">
+              <a:spAutoFit/>
+            </a:bodyPr>
+            <a:lstStyle/>
+            <a:p>
+              <a:pPr algn="ctr"/>
+              <a:r>
+                <a:rPr lang="en-US" dirty="0">
+                  <a:latin typeface="Times New Roman" panose="02020603050405020304" pitchFamily="18" charset="0"/>
+                  <a:cs typeface="Times New Roman" panose="02020603050405020304" pitchFamily="18" charset="0"/>
+                </a:rPr>
+                <a:t>Reference elevation</a:t>
+              </a:r>
+            </a:p>
+          </p:txBody>
+        </p:sp>
         <p:cxnSp>
           <p:nvCxnSpPr>
-            <p:cNvPr id="45" name="Straight Connector 44">
+            <p:cNvPr id="52" name="Straight Arrow Connector 51">
               <a:extLst>
                 <a:ext uri="{FF2B5EF4-FFF2-40B4-BE49-F238E27FC236}">
-                  <a16:creationId xmlns:a16="http://schemas.microsoft.com/office/drawing/2014/main" id="{FC382F06-1410-47AC-8FC6-444E1A4A6FB0}"/>
+                  <a16:creationId xmlns:a16="http://schemas.microsoft.com/office/drawing/2014/main" id="{D0C0DBED-AAA5-474E-A50C-11A708625030}"/>
                 </a:ext>
               </a:extLst>
             </p:cNvPr>
@@ -5014,23 +5117,30 @@
             <p:nvPr/>
           </p:nvCxnSpPr>
           <p:spPr>
-            <a:xfrm>
-              <a:off x="6403468" y="1598642"/>
-              <a:ext cx="1224717" cy="0"/>
+            <a:xfrm flipH="1">
+              <a:off x="9000870" y="5284827"/>
+              <a:ext cx="446324" cy="6429"/>
             </a:xfrm>
-            <a:prstGeom prst="line">
+            <a:prstGeom prst="straightConnector1">
               <a:avLst/>
             </a:prstGeom>
+            <a:ln w="19050">
+              <a:solidFill>
+                <a:schemeClr val="tx1"/>
+              </a:solidFill>
+              <a:headEnd type="none" w="lg" len="lg"/>
+              <a:tailEnd type="triangle" w="lg" len="lg"/>
+            </a:ln>
           </p:spPr>
           <p:style>
             <a:lnRef idx="1">
-              <a:schemeClr val="dk1"/>
+              <a:schemeClr val="accent1"/>
             </a:lnRef>
             <a:fillRef idx="0">
-              <a:schemeClr val="dk1"/>
+              <a:schemeClr val="accent1"/>
             </a:fillRef>
             <a:effectRef idx="0">
-              <a:schemeClr val="dk1"/>
+              <a:schemeClr val="accent1"/>
             </a:effectRef>
             <a:fontRef idx="minor">
               <a:schemeClr val="tx1"/>

</xml_diff>